<commit_message>
update and cleanup ppt slides
</commit_message>
<xml_diff>
--- a/02-model-development-slides.pptx
+++ b/02-model-development-slides.pptx
@@ -2024,7 +2024,7 @@
           </a:ln>
           <a:extLst>
             <a:ext uri="{C572A759-6A51-4108-AA02-DFA0A04FC94B}">
-              <ma14:wrappingTextBoxFlag xmlns="" xmlns:ma14="http://schemas.microsoft.com/office/mac/drawingml/2011/main" val="1"/>
+              <ma14:wrappingTextBoxFlag xmlns:ma14="http://schemas.microsoft.com/office/mac/drawingml/2011/main" xmlns="" val="1"/>
             </a:ext>
           </a:extLst>
         </p:spPr>
@@ -2063,7 +2063,7 @@
           </a:ln>
           <a:extLst>
             <a:ext uri="{C572A759-6A51-4108-AA02-DFA0A04FC94B}">
-              <ma14:wrappingTextBoxFlag xmlns="" xmlns:ma14="http://schemas.microsoft.com/office/mac/drawingml/2011/main" val="1"/>
+              <ma14:wrappingTextBoxFlag xmlns:ma14="http://schemas.microsoft.com/office/mac/drawingml/2011/main" xmlns="" val="1"/>
             </a:ext>
           </a:extLst>
         </p:spPr>
@@ -3123,7 +3123,7 @@
           </a:ln>
           <a:extLst>
             <a:ext uri="{C572A759-6A51-4108-AA02-DFA0A04FC94B}">
-              <ma14:wrappingTextBoxFlag xmlns="" xmlns:ma14="http://schemas.microsoft.com/office/mac/drawingml/2011/main" val="1"/>
+              <ma14:wrappingTextBoxFlag xmlns:ma14="http://schemas.microsoft.com/office/mac/drawingml/2011/main" xmlns="" val="1"/>
             </a:ext>
           </a:extLst>
         </p:spPr>
@@ -3170,7 +3170,7 @@
           </a:ln>
           <a:extLst>
             <a:ext uri="{C572A759-6A51-4108-AA02-DFA0A04FC94B}">
-              <ma14:wrappingTextBoxFlag xmlns="" xmlns:ma14="http://schemas.microsoft.com/office/mac/drawingml/2011/main" val="1"/>
+              <ma14:wrappingTextBoxFlag xmlns:ma14="http://schemas.microsoft.com/office/mac/drawingml/2011/main" xmlns="" val="1"/>
             </a:ext>
           </a:extLst>
         </p:spPr>
@@ -3244,7 +3244,7 @@
           </a:ln>
           <a:extLst>
             <a:ext uri="{C572A759-6A51-4108-AA02-DFA0A04FC94B}">
-              <ma14:wrappingTextBoxFlag xmlns="" xmlns:ma14="http://schemas.microsoft.com/office/mac/drawingml/2011/main" val="1"/>
+              <ma14:wrappingTextBoxFlag xmlns:ma14="http://schemas.microsoft.com/office/mac/drawingml/2011/main" xmlns="" val="1"/>
             </a:ext>
           </a:extLst>
         </p:spPr>
@@ -3294,7 +3294,7 @@
           </a:ln>
           <a:extLst>
             <a:ext uri="{C572A759-6A51-4108-AA02-DFA0A04FC94B}">
-              <ma14:wrappingTextBoxFlag xmlns="" xmlns:ma14="http://schemas.microsoft.com/office/mac/drawingml/2011/main" val="1"/>
+              <ma14:wrappingTextBoxFlag xmlns:ma14="http://schemas.microsoft.com/office/mac/drawingml/2011/main" xmlns="" val="1"/>
             </a:ext>
           </a:extLst>
         </p:spPr>
@@ -3402,7 +3402,7 @@
           </a:ln>
           <a:extLst>
             <a:ext uri="{C572A759-6A51-4108-AA02-DFA0A04FC94B}">
-              <ma14:wrappingTextBoxFlag xmlns="" xmlns:ma14="http://schemas.microsoft.com/office/mac/drawingml/2011/main" val="1"/>
+              <ma14:wrappingTextBoxFlag xmlns:ma14="http://schemas.microsoft.com/office/mac/drawingml/2011/main" xmlns="" val="1"/>
             </a:ext>
           </a:extLst>
         </p:spPr>
@@ -3446,7 +3446,7 @@
           </a:ln>
           <a:extLst>
             <a:ext uri="{C572A759-6A51-4108-AA02-DFA0A04FC94B}">
-              <ma14:wrappingTextBoxFlag xmlns="" xmlns:ma14="http://schemas.microsoft.com/office/mac/drawingml/2011/main" val="1"/>
+              <ma14:wrappingTextBoxFlag xmlns:ma14="http://schemas.microsoft.com/office/mac/drawingml/2011/main" xmlns="" val="1"/>
             </a:ext>
           </a:extLst>
         </p:spPr>
@@ -3495,7 +3495,7 @@
           </a:ln>
           <a:extLst>
             <a:ext uri="{C572A759-6A51-4108-AA02-DFA0A04FC94B}">
-              <ma14:wrappingTextBoxFlag xmlns="" xmlns:ma14="http://schemas.microsoft.com/office/mac/drawingml/2011/main" val="1"/>
+              <ma14:wrappingTextBoxFlag xmlns:ma14="http://schemas.microsoft.com/office/mac/drawingml/2011/main" xmlns="" val="1"/>
             </a:ext>
           </a:extLst>
         </p:spPr>
@@ -3571,7 +3571,7 @@
           </a:ln>
           <a:extLst>
             <a:ext uri="{C572A759-6A51-4108-AA02-DFA0A04FC94B}">
-              <ma14:wrappingTextBoxFlag xmlns="" xmlns:ma14="http://schemas.microsoft.com/office/mac/drawingml/2011/main" val="1"/>
+              <ma14:wrappingTextBoxFlag xmlns:ma14="http://schemas.microsoft.com/office/mac/drawingml/2011/main" xmlns="" val="1"/>
             </a:ext>
           </a:extLst>
         </p:spPr>
@@ -3599,10 +3599,10 @@
       </p:sp>
       <p:pic>
         <p:nvPicPr>
-          <p:cNvPr id="3" name="Picture 2" descr="Chart, scatter chart&#10;&#10;Description automatically generated">
+          <p:cNvPr id="4" name="Picture 3" descr="Chart, scatter chart&#10;&#10;Description automatically generated">
             <a:extLst>
               <a:ext uri="{FF2B5EF4-FFF2-40B4-BE49-F238E27FC236}">
-                <a16:creationId xmlns:a16="http://schemas.microsoft.com/office/drawing/2014/main" id="{9D66AE10-4259-4717-96B7-65DB8942A29D}"/>
+                <a16:creationId xmlns:a16="http://schemas.microsoft.com/office/drawing/2014/main" id="{475E45B1-9EAB-428C-98CC-D4BBB7B0FE34}"/>
               </a:ext>
             </a:extLst>
           </p:cNvPr>
@@ -3625,8 +3625,8 @@
         </p:blipFill>
         <p:spPr>
           <a:xfrm>
-            <a:off x="4999880" y="1643436"/>
-            <a:ext cx="3770746" cy="2592388"/>
+            <a:off x="4804377" y="1591483"/>
+            <a:ext cx="3855725" cy="2645088"/>
           </a:xfrm>
           <a:prstGeom prst="rect">
             <a:avLst/>
@@ -3715,7 +3715,7 @@
           </a:ln>
           <a:extLst>
             <a:ext uri="{C572A759-6A51-4108-AA02-DFA0A04FC94B}">
-              <ma14:wrappingTextBoxFlag xmlns:ma14="http://schemas.microsoft.com/office/mac/drawingml/2011/main" xmlns="" val="1"/>
+              <ma14:wrappingTextBoxFlag xmlns="" xmlns:ma14="http://schemas.microsoft.com/office/mac/drawingml/2011/main" val="1"/>
             </a:ext>
           </a:extLst>
         </p:spPr>
@@ -3759,7 +3759,7 @@
           </a:ln>
           <a:extLst>
             <a:ext uri="{C572A759-6A51-4108-AA02-DFA0A04FC94B}">
-              <ma14:wrappingTextBoxFlag xmlns:ma14="http://schemas.microsoft.com/office/mac/drawingml/2011/main" xmlns="" val="1"/>
+              <ma14:wrappingTextBoxFlag xmlns="" xmlns:ma14="http://schemas.microsoft.com/office/mac/drawingml/2011/main" val="1"/>
             </a:ext>
           </a:extLst>
         </p:spPr>
@@ -3807,7 +3807,7 @@
           </a:ln>
           <a:extLst>
             <a:ext uri="{C572A759-6A51-4108-AA02-DFA0A04FC94B}">
-              <ma14:wrappingTextBoxFlag xmlns:ma14="http://schemas.microsoft.com/office/mac/drawingml/2011/main" xmlns="" val="1"/>
+              <ma14:wrappingTextBoxFlag xmlns="" xmlns:ma14="http://schemas.microsoft.com/office/mac/drawingml/2011/main" val="1"/>
             </a:ext>
           </a:extLst>
         </p:spPr>
@@ -3873,7 +3873,7 @@
           </a:ln>
           <a:extLst>
             <a:ext uri="{C572A759-6A51-4108-AA02-DFA0A04FC94B}">
-              <ma14:wrappingTextBoxFlag xmlns:ma14="http://schemas.microsoft.com/office/mac/drawingml/2011/main" xmlns="" val="1"/>
+              <ma14:wrappingTextBoxFlag xmlns="" xmlns:ma14="http://schemas.microsoft.com/office/mac/drawingml/2011/main" val="1"/>
             </a:ext>
           </a:extLst>
         </p:spPr>
@@ -3901,10 +3901,10 @@
       </p:sp>
       <p:pic>
         <p:nvPicPr>
-          <p:cNvPr id="3" name="Picture 2" descr="Chart&#10;&#10;Description automatically generated">
+          <p:cNvPr id="4" name="Picture 3" descr="Chart&#10;&#10;Description automatically generated">
             <a:extLst>
               <a:ext uri="{FF2B5EF4-FFF2-40B4-BE49-F238E27FC236}">
-                <a16:creationId xmlns:a16="http://schemas.microsoft.com/office/drawing/2014/main" id="{3374934D-9F9D-4124-99E3-97E0CD44B9F0}"/>
+                <a16:creationId xmlns:a16="http://schemas.microsoft.com/office/drawing/2014/main" id="{112EF14A-51D0-4B3F-A55F-8EA3950951B7}"/>
               </a:ext>
             </a:extLst>
           </p:cNvPr>
@@ -3927,8 +3927,8 @@
         </p:blipFill>
         <p:spPr>
           <a:xfrm>
-            <a:off x="4937380" y="1792661"/>
-            <a:ext cx="3833245" cy="2635356"/>
+            <a:off x="4804377" y="1685174"/>
+            <a:ext cx="3814627" cy="2616895"/>
           </a:xfrm>
           <a:prstGeom prst="rect">
             <a:avLst/>
@@ -4022,7 +4022,7 @@
           </a:ln>
           <a:extLst>
             <a:ext uri="{C572A759-6A51-4108-AA02-DFA0A04FC94B}">
-              <ma14:wrappingTextBoxFlag xmlns:ma14="http://schemas.microsoft.com/office/mac/drawingml/2011/main" xmlns="" val="1"/>
+              <ma14:wrappingTextBoxFlag xmlns="" xmlns:ma14="http://schemas.microsoft.com/office/mac/drawingml/2011/main" val="1"/>
             </a:ext>
           </a:extLst>
         </p:spPr>
@@ -4066,7 +4066,7 @@
           </a:ln>
           <a:extLst>
             <a:ext uri="{C572A759-6A51-4108-AA02-DFA0A04FC94B}">
-              <ma14:wrappingTextBoxFlag xmlns:ma14="http://schemas.microsoft.com/office/mac/drawingml/2011/main" xmlns="" val="1"/>
+              <ma14:wrappingTextBoxFlag xmlns="" xmlns:ma14="http://schemas.microsoft.com/office/mac/drawingml/2011/main" val="1"/>
             </a:ext>
           </a:extLst>
         </p:spPr>
@@ -4114,7 +4114,7 @@
           </a:ln>
           <a:extLst>
             <a:ext uri="{C572A759-6A51-4108-AA02-DFA0A04FC94B}">
-              <ma14:wrappingTextBoxFlag xmlns:ma14="http://schemas.microsoft.com/office/mac/drawingml/2011/main" xmlns="" val="1"/>
+              <ma14:wrappingTextBoxFlag xmlns="" xmlns:ma14="http://schemas.microsoft.com/office/mac/drawingml/2011/main" val="1"/>
             </a:ext>
           </a:extLst>
         </p:spPr>
@@ -4190,7 +4190,7 @@
           </a:ln>
           <a:extLst>
             <a:ext uri="{C572A759-6A51-4108-AA02-DFA0A04FC94B}">
-              <ma14:wrappingTextBoxFlag xmlns:ma14="http://schemas.microsoft.com/office/mac/drawingml/2011/main" xmlns="" val="1"/>
+              <ma14:wrappingTextBoxFlag xmlns="" xmlns:ma14="http://schemas.microsoft.com/office/mac/drawingml/2011/main" val="1"/>
             </a:ext>
           </a:extLst>
         </p:spPr>
@@ -4218,10 +4218,10 @@
       </p:sp>
       <p:pic>
         <p:nvPicPr>
-          <p:cNvPr id="3" name="Picture 2" descr="Chart, scatter chart&#10;&#10;Description automatically generated">
+          <p:cNvPr id="4" name="Picture 3" descr="Chart, scatter chart&#10;&#10;Description automatically generated">
             <a:extLst>
               <a:ext uri="{FF2B5EF4-FFF2-40B4-BE49-F238E27FC236}">
-                <a16:creationId xmlns:a16="http://schemas.microsoft.com/office/drawing/2014/main" id="{CEED98FB-6EA8-446B-8490-2E147E42F663}"/>
+                <a16:creationId xmlns:a16="http://schemas.microsoft.com/office/drawing/2014/main" id="{D479870D-C741-46CD-8759-682AECD27B4F}"/>
               </a:ext>
             </a:extLst>
           </p:cNvPr>
@@ -4244,8 +4244,8 @@
         </p:blipFill>
         <p:spPr>
           <a:xfrm>
-            <a:off x="5112192" y="1751013"/>
-            <a:ext cx="3658433" cy="2515173"/>
+            <a:off x="5042647" y="1591483"/>
+            <a:ext cx="3657040" cy="2508788"/>
           </a:xfrm>
           <a:prstGeom prst="rect">
             <a:avLst/>
@@ -4339,7 +4339,7 @@
           </a:ln>
           <a:extLst>
             <a:ext uri="{C572A759-6A51-4108-AA02-DFA0A04FC94B}">
-              <ma14:wrappingTextBoxFlag xmlns:ma14="http://schemas.microsoft.com/office/mac/drawingml/2011/main" xmlns="" val="1"/>
+              <ma14:wrappingTextBoxFlag xmlns="" xmlns:ma14="http://schemas.microsoft.com/office/mac/drawingml/2011/main" val="1"/>
             </a:ext>
           </a:extLst>
         </p:spPr>
@@ -4373,7 +4373,7 @@
         <p:spPr>
           <a:xfrm>
             <a:off x="205025" y="1083299"/>
-            <a:ext cx="8565600" cy="920086"/>
+            <a:ext cx="8565600" cy="508184"/>
           </a:xfrm>
           <a:prstGeom prst="rect">
             <a:avLst/>
@@ -4383,7 +4383,7 @@
           </a:ln>
           <a:extLst>
             <a:ext uri="{C572A759-6A51-4108-AA02-DFA0A04FC94B}">
-              <ma14:wrappingTextBoxFlag xmlns:ma14="http://schemas.microsoft.com/office/mac/drawingml/2011/main" xmlns="" val="1"/>
+              <ma14:wrappingTextBoxFlag xmlns="" xmlns:ma14="http://schemas.microsoft.com/office/mac/drawingml/2011/main" val="1"/>
             </a:ext>
           </a:extLst>
         </p:spPr>
@@ -4406,9 +4406,10 @@
           </a:lstStyle>
           <a:p>
             <a:r>
-              <a:rPr dirty="0"/>
-              <a:t>Place headline insight or information here. This should be the most important point for this slide.</a:t>
-            </a:r>
+              <a:rPr lang="en-MY" dirty="0"/>
+              <a:t>Distribution of Existing Customers</a:t>
+            </a:r>
+            <a:endParaRPr dirty="0"/>
           </a:p>
         </p:txBody>
       </p:sp>
@@ -4420,8 +4421,8 @@
         </p:nvSpPr>
         <p:spPr>
           <a:xfrm>
-            <a:off x="205025" y="2164724"/>
-            <a:ext cx="4134600" cy="436851"/>
+            <a:off x="205025" y="1591483"/>
+            <a:ext cx="4366975" cy="3197190"/>
           </a:xfrm>
           <a:prstGeom prst="rect">
             <a:avLst/>
@@ -4431,12 +4432,12 @@
           </a:ln>
           <a:extLst>
             <a:ext uri="{C572A759-6A51-4108-AA02-DFA0A04FC94B}">
-              <ma14:wrappingTextBoxFlag xmlns:ma14="http://schemas.microsoft.com/office/mac/drawingml/2011/main" xmlns="" val="1"/>
+              <ma14:wrappingTextBoxFlag xmlns="" xmlns:ma14="http://schemas.microsoft.com/office/mac/drawingml/2011/main" val="1"/>
             </a:ext>
           </a:extLst>
         </p:spPr>
         <p:txBody>
-          <a:bodyPr lIns="91424" tIns="91424" rIns="91424" bIns="91424">
+          <a:bodyPr wrap="square" lIns="91424" tIns="91424" rIns="91424" bIns="91424">
             <a:spAutoFit/>
           </a:bodyPr>
           <a:lstStyle>
@@ -4454,112 +4455,93 @@
           </a:lstStyle>
           <a:p>
             <a:r>
-              <a:t>Place any information about this point here.</a:t>
-            </a:r>
-          </a:p>
-        </p:txBody>
-      </p:sp>
-      <p:grpSp>
-        <p:nvGrpSpPr>
-          <p:cNvPr id="145" name="Shape 92"/>
-          <p:cNvGrpSpPr/>
-          <p:nvPr/>
-        </p:nvGrpSpPr>
-        <p:grpSpPr>
-          <a:xfrm>
-            <a:off x="4969974" y="2164724"/>
-            <a:ext cx="3800702" cy="2649302"/>
-            <a:chOff x="0" y="0"/>
-            <a:chExt cx="3800700" cy="2649300"/>
-          </a:xfrm>
-        </p:grpSpPr>
-        <p:sp>
-          <p:nvSpPr>
-            <p:cNvPr id="143" name="Rectangle"/>
-            <p:cNvSpPr/>
-            <p:nvPr/>
-          </p:nvSpPr>
-          <p:spPr>
-            <a:xfrm>
-              <a:off x="-1" y="-1"/>
-              <a:ext cx="3800702" cy="2649302"/>
-            </a:xfrm>
-            <a:prstGeom prst="rect">
-              <a:avLst/>
-            </a:prstGeom>
-            <a:solidFill>
-              <a:srgbClr val="EEEEEE"/>
-            </a:solidFill>
-            <a:ln w="12700" cap="flat">
-              <a:noFill/>
-              <a:miter lim="400000"/>
-            </a:ln>
-            <a:effectLst/>
-          </p:spPr>
-          <p:txBody>
-            <a:bodyPr wrap="square" lIns="45719" tIns="45719" rIns="45719" bIns="45719" numCol="1" anchor="ctr">
-              <a:noAutofit/>
-            </a:bodyPr>
-            <a:lstStyle/>
-            <a:p>
-              <a:pPr algn="ctr">
-                <a:defRPr>
-                  <a:solidFill>
-                    <a:srgbClr val="666666"/>
-                  </a:solidFill>
-                </a:defRPr>
-              </a:pPr>
-              <a:endParaRPr/>
-            </a:p>
-          </p:txBody>
-        </p:sp>
-        <p:sp>
-          <p:nvSpPr>
-            <p:cNvPr id="144" name="Place any supporting images, graphs, data or extra text here."/>
-            <p:cNvSpPr/>
-            <p:nvPr/>
-          </p:nvSpPr>
-          <p:spPr>
-            <a:xfrm>
-              <a:off x="-1" y="1032933"/>
-              <a:ext cx="3800702" cy="583434"/>
-            </a:xfrm>
-            <a:prstGeom prst="rect">
-              <a:avLst/>
-            </a:prstGeom>
-            <a:noFill/>
-            <a:ln w="12700" cap="flat">
-              <a:noFill/>
-              <a:miter lim="400000"/>
-            </a:ln>
-            <a:effectLst/>
-            <a:extLst>
-              <a:ext uri="{C572A759-6A51-4108-AA02-DFA0A04FC94B}">
-                <ma14:wrappingTextBoxFlag xmlns:ma14="http://schemas.microsoft.com/office/mac/drawingml/2011/main" xmlns="" val="1"/>
-              </a:ext>
-            </a:extLst>
-          </p:spPr>
-          <p:txBody>
-            <a:bodyPr wrap="square" lIns="91424" tIns="91424" rIns="91424" bIns="91424" numCol="1" anchor="ctr">
-              <a:spAutoFit/>
-            </a:bodyPr>
-            <a:lstStyle>
-              <a:lvl1pPr algn="ctr">
-                <a:defRPr>
-                  <a:solidFill>
-                    <a:srgbClr val="666666"/>
-                  </a:solidFill>
-                </a:defRPr>
-              </a:lvl1pPr>
-            </a:lstStyle>
-            <a:p>
-              <a:r>
-                <a:t>Place any supporting images, graphs, data or extra text here.</a:t>
-              </a:r>
-            </a:p>
-          </p:txBody>
-        </p:sp>
-      </p:grpSp>
+              <a:rPr lang="en-MY" sz="900" dirty="0"/>
+              <a:t>1. Core - Your Best Customers</a:t>
+            </a:r>
+          </a:p>
+          <a:p>
+            <a:r>
+              <a:rPr lang="en-MY" sz="900" dirty="0"/>
+              <a:t>Who They Are: Highly engaged customers who have bought the most recent, the most often, and generated the most revenue.</a:t>
+            </a:r>
+          </a:p>
+          <a:p>
+            <a:endParaRPr lang="en-MY" sz="900" dirty="0"/>
+          </a:p>
+          <a:p>
+            <a:r>
+              <a:rPr lang="en-MY" sz="900" dirty="0"/>
+              <a:t>2. Loyal - Your Most Loyal Customers</a:t>
+            </a:r>
+          </a:p>
+          <a:p>
+            <a:r>
+              <a:rPr lang="en-MY" sz="900" dirty="0"/>
+              <a:t>Who They Are: Customers who buy the most often from your store.</a:t>
+            </a:r>
+          </a:p>
+          <a:p>
+            <a:endParaRPr lang="en-MY" sz="900" dirty="0"/>
+          </a:p>
+          <a:p>
+            <a:r>
+              <a:rPr lang="en-MY" sz="900" dirty="0"/>
+              <a:t>3. Whales - Your Highest Paying Customers</a:t>
+            </a:r>
+          </a:p>
+          <a:p>
+            <a:r>
+              <a:rPr lang="en-MY" sz="900" dirty="0"/>
+              <a:t>Who They Are: Customers who have generated the most revenue for your store.</a:t>
+            </a:r>
+          </a:p>
+          <a:p>
+            <a:endParaRPr lang="en-MY" sz="900" dirty="0"/>
+          </a:p>
+          <a:p>
+            <a:r>
+              <a:rPr lang="en-MY" sz="900" dirty="0"/>
+              <a:t>4. Becoming Loyal - Customers With Good Impression On The Company</a:t>
+            </a:r>
+          </a:p>
+          <a:p>
+            <a:r>
+              <a:rPr lang="en-MY" sz="900" dirty="0"/>
+              <a:t>Who They Are: Customers who are becoming loyal by recently purchases and with promising frequency.</a:t>
+            </a:r>
+          </a:p>
+          <a:p>
+            <a:endParaRPr lang="en-MY" sz="900" dirty="0"/>
+          </a:p>
+          <a:p>
+            <a:r>
+              <a:rPr lang="en-MY" sz="900" dirty="0"/>
+              <a:t>5. Rookies - Your Newest Customers</a:t>
+            </a:r>
+          </a:p>
+          <a:p>
+            <a:r>
+              <a:rPr lang="en-MY" sz="900" dirty="0"/>
+              <a:t>Who They Are: First time buyers on your site.</a:t>
+            </a:r>
+          </a:p>
+          <a:p>
+            <a:endParaRPr lang="en-MY" sz="900" dirty="0"/>
+          </a:p>
+          <a:p>
+            <a:r>
+              <a:rPr lang="en-MY" sz="900" dirty="0"/>
+              <a:t>6. Slipping - Once Loyal, Now Gone</a:t>
+            </a:r>
+          </a:p>
+          <a:p>
+            <a:r>
+              <a:rPr lang="en-MY" sz="900" dirty="0"/>
+              <a:t>Who They Are: Great past customers who haven't bought in awhile.</a:t>
+            </a:r>
+          </a:p>
+        </p:txBody>
+      </p:sp>
       <p:sp>
         <p:nvSpPr>
           <p:cNvPr id="146" name="Note: The data and information in this document is reflective of a hypothetical situation and client. This document is to be used for KPMG Virtual Internship purposes only."/>
@@ -4582,7 +4564,7 @@
           </a:ln>
           <a:extLst>
             <a:ext uri="{C572A759-6A51-4108-AA02-DFA0A04FC94B}">
-              <ma14:wrappingTextBoxFlag xmlns:ma14="http://schemas.microsoft.com/office/mac/drawingml/2011/main" xmlns="" val="1"/>
+              <ma14:wrappingTextBoxFlag xmlns="" xmlns:ma14="http://schemas.microsoft.com/office/mac/drawingml/2011/main" val="1"/>
             </a:ext>
           </a:extLst>
         </p:spPr>
@@ -4608,6 +4590,42 @@
           </a:p>
         </p:txBody>
       </p:sp>
+      <p:pic>
+        <p:nvPicPr>
+          <p:cNvPr id="3" name="Picture 2" descr="Chart, pie chart&#10;&#10;Description automatically generated">
+            <a:extLst>
+              <a:ext uri="{FF2B5EF4-FFF2-40B4-BE49-F238E27FC236}">
+                <a16:creationId xmlns:a16="http://schemas.microsoft.com/office/drawing/2014/main" id="{F26EBB14-BE13-486B-998C-A9FE44E31373}"/>
+              </a:ext>
+            </a:extLst>
+          </p:cNvPr>
+          <p:cNvPicPr>
+            <a:picLocks noChangeAspect="1"/>
+          </p:cNvPicPr>
+          <p:nvPr/>
+        </p:nvPicPr>
+        <p:blipFill>
+          <a:blip r:embed="rId2">
+            <a:extLst>
+              <a:ext uri="{28A0092B-C50C-407E-A947-70E740481C1C}">
+                <a14:useLocalDpi xmlns:a14="http://schemas.microsoft.com/office/drawing/2010/main" val="0"/>
+              </a:ext>
+            </a:extLst>
+          </a:blip>
+          <a:stretch>
+            <a:fillRect/>
+          </a:stretch>
+        </p:blipFill>
+        <p:spPr>
+          <a:xfrm>
+            <a:off x="4572000" y="1591483"/>
+            <a:ext cx="4275526" cy="2939424"/>
+          </a:xfrm>
+          <a:prstGeom prst="rect">
+            <a:avLst/>
+          </a:prstGeom>
+        </p:spPr>
+      </p:pic>
     </p:spTree>
     <p:extLst>
       <p:ext uri="{BB962C8B-B14F-4D97-AF65-F5344CB8AC3E}">
@@ -4695,7 +4713,7 @@
           </a:ln>
           <a:extLst>
             <a:ext uri="{C572A759-6A51-4108-AA02-DFA0A04FC94B}">
-              <ma14:wrappingTextBoxFlag xmlns="" xmlns:ma14="http://schemas.microsoft.com/office/mac/drawingml/2011/main" val="1"/>
+              <ma14:wrappingTextBoxFlag xmlns:ma14="http://schemas.microsoft.com/office/mac/drawingml/2011/main" xmlns="" val="1"/>
             </a:ext>
           </a:extLst>
         </p:spPr>
@@ -4738,7 +4756,7 @@
           </a:ln>
           <a:extLst>
             <a:ext uri="{C572A759-6A51-4108-AA02-DFA0A04FC94B}">
-              <ma14:wrappingTextBoxFlag xmlns="" xmlns:ma14="http://schemas.microsoft.com/office/mac/drawingml/2011/main" val="1"/>
+              <ma14:wrappingTextBoxFlag xmlns:ma14="http://schemas.microsoft.com/office/mac/drawingml/2011/main" xmlns="" val="1"/>
             </a:ext>
           </a:extLst>
         </p:spPr>
@@ -4785,7 +4803,7 @@
           </a:ln>
           <a:extLst>
             <a:ext uri="{C572A759-6A51-4108-AA02-DFA0A04FC94B}">
-              <ma14:wrappingTextBoxFlag xmlns="" xmlns:ma14="http://schemas.microsoft.com/office/mac/drawingml/2011/main" val="1"/>
+              <ma14:wrappingTextBoxFlag xmlns:ma14="http://schemas.microsoft.com/office/mac/drawingml/2011/main" xmlns="" val="1"/>
             </a:ext>
           </a:extLst>
         </p:spPr>
@@ -4889,7 +4907,7 @@
             <a:effectLst/>
             <a:extLst>
               <a:ext uri="{C572A759-6A51-4108-AA02-DFA0A04FC94B}">
-                <ma14:wrappingTextBoxFlag xmlns="" xmlns:ma14="http://schemas.microsoft.com/office/mac/drawingml/2011/main" val="1"/>
+                <ma14:wrappingTextBoxFlag xmlns:ma14="http://schemas.microsoft.com/office/mac/drawingml/2011/main" xmlns="" val="1"/>
               </a:ext>
             </a:extLst>
           </p:spPr>
@@ -4936,7 +4954,7 @@
           </a:ln>
           <a:extLst>
             <a:ext uri="{C572A759-6A51-4108-AA02-DFA0A04FC94B}">
-              <ma14:wrappingTextBoxFlag xmlns="" xmlns:ma14="http://schemas.microsoft.com/office/mac/drawingml/2011/main" val="1"/>
+              <ma14:wrappingTextBoxFlag xmlns:ma14="http://schemas.microsoft.com/office/mac/drawingml/2011/main" xmlns="" val="1"/>
             </a:ext>
           </a:extLst>
         </p:spPr>
@@ -5081,7 +5099,7 @@
           </a:ln>
           <a:extLst>
             <a:ext uri="{C572A759-6A51-4108-AA02-DFA0A04FC94B}">
-              <ma14:wrappingTextBoxFlag xmlns="" xmlns:ma14="http://schemas.microsoft.com/office/mac/drawingml/2011/main" val="1"/>
+              <ma14:wrappingTextBoxFlag xmlns:ma14="http://schemas.microsoft.com/office/mac/drawingml/2011/main" xmlns="" val="1"/>
             </a:ext>
           </a:extLst>
         </p:spPr>
@@ -5131,7 +5149,7 @@
           </a:ln>
           <a:extLst>
             <a:ext uri="{C572A759-6A51-4108-AA02-DFA0A04FC94B}">
-              <ma14:wrappingTextBoxFlag xmlns="" xmlns:ma14="http://schemas.microsoft.com/office/mac/drawingml/2011/main" val="1"/>
+              <ma14:wrappingTextBoxFlag xmlns:ma14="http://schemas.microsoft.com/office/mac/drawingml/2011/main" xmlns="" val="1"/>
             </a:ext>
           </a:extLst>
         </p:spPr>
@@ -5239,7 +5257,7 @@
           </a:ln>
           <a:extLst>
             <a:ext uri="{C572A759-6A51-4108-AA02-DFA0A04FC94B}">
-              <ma14:wrappingTextBoxFlag xmlns="" xmlns:ma14="http://schemas.microsoft.com/office/mac/drawingml/2011/main" val="1"/>
+              <ma14:wrappingTextBoxFlag xmlns:ma14="http://schemas.microsoft.com/office/mac/drawingml/2011/main" xmlns="" val="1"/>
             </a:ext>
           </a:extLst>
         </p:spPr>
@@ -5282,7 +5300,7 @@
           </a:ln>
           <a:extLst>
             <a:ext uri="{C572A759-6A51-4108-AA02-DFA0A04FC94B}">
-              <ma14:wrappingTextBoxFlag xmlns="" xmlns:ma14="http://schemas.microsoft.com/office/mac/drawingml/2011/main" val="1"/>
+              <ma14:wrappingTextBoxFlag xmlns:ma14="http://schemas.microsoft.com/office/mac/drawingml/2011/main" xmlns="" val="1"/>
             </a:ext>
           </a:extLst>
         </p:spPr>
@@ -5332,7 +5350,7 @@
           </a:ln>
           <a:extLst>
             <a:ext uri="{C572A759-6A51-4108-AA02-DFA0A04FC94B}">
-              <ma14:wrappingTextBoxFlag xmlns="" xmlns:ma14="http://schemas.microsoft.com/office/mac/drawingml/2011/main" val="1"/>
+              <ma14:wrappingTextBoxFlag xmlns:ma14="http://schemas.microsoft.com/office/mac/drawingml/2011/main" xmlns="" val="1"/>
             </a:ext>
           </a:extLst>
         </p:spPr>
@@ -5440,7 +5458,7 @@
           </a:ln>
           <a:extLst>
             <a:ext uri="{C572A759-6A51-4108-AA02-DFA0A04FC94B}">
-              <ma14:wrappingTextBoxFlag xmlns="" xmlns:ma14="http://schemas.microsoft.com/office/mac/drawingml/2011/main" val="1"/>
+              <ma14:wrappingTextBoxFlag xmlns:ma14="http://schemas.microsoft.com/office/mac/drawingml/2011/main" xmlns="" val="1"/>
             </a:ext>
           </a:extLst>
         </p:spPr>
@@ -5483,7 +5501,7 @@
           </a:ln>
           <a:extLst>
             <a:ext uri="{C572A759-6A51-4108-AA02-DFA0A04FC94B}">
-              <ma14:wrappingTextBoxFlag xmlns="" xmlns:ma14="http://schemas.microsoft.com/office/mac/drawingml/2011/main" val="1"/>
+              <ma14:wrappingTextBoxFlag xmlns:ma14="http://schemas.microsoft.com/office/mac/drawingml/2011/main" xmlns="" val="1"/>
             </a:ext>
           </a:extLst>
         </p:spPr>
@@ -5600,7 +5618,7 @@
           </a:ln>
           <a:extLst>
             <a:ext uri="{C572A759-6A51-4108-AA02-DFA0A04FC94B}">
-              <ma14:wrappingTextBoxFlag xmlns="" xmlns:ma14="http://schemas.microsoft.com/office/mac/drawingml/2011/main" val="1"/>
+              <ma14:wrappingTextBoxFlag xmlns:ma14="http://schemas.microsoft.com/office/mac/drawingml/2011/main" xmlns="" val="1"/>
             </a:ext>
           </a:extLst>
         </p:spPr>
@@ -5708,7 +5726,7 @@
           </a:ln>
           <a:extLst>
             <a:ext uri="{C572A759-6A51-4108-AA02-DFA0A04FC94B}">
-              <ma14:wrappingTextBoxFlag xmlns="" xmlns:ma14="http://schemas.microsoft.com/office/mac/drawingml/2011/main" val="1"/>
+              <ma14:wrappingTextBoxFlag xmlns:ma14="http://schemas.microsoft.com/office/mac/drawingml/2011/main" xmlns="" val="1"/>
             </a:ext>
           </a:extLst>
         </p:spPr>
@@ -5751,7 +5769,7 @@
           </a:ln>
           <a:extLst>
             <a:ext uri="{C572A759-6A51-4108-AA02-DFA0A04FC94B}">
-              <ma14:wrappingTextBoxFlag xmlns="" xmlns:ma14="http://schemas.microsoft.com/office/mac/drawingml/2011/main" val="1"/>
+              <ma14:wrappingTextBoxFlag xmlns:ma14="http://schemas.microsoft.com/office/mac/drawingml/2011/main" xmlns="" val="1"/>
             </a:ext>
           </a:extLst>
         </p:spPr>
@@ -5800,7 +5818,7 @@
           </a:ln>
           <a:extLst>
             <a:ext uri="{C572A759-6A51-4108-AA02-DFA0A04FC94B}">
-              <ma14:wrappingTextBoxFlag xmlns="" xmlns:ma14="http://schemas.microsoft.com/office/mac/drawingml/2011/main" val="1"/>
+              <ma14:wrappingTextBoxFlag xmlns:ma14="http://schemas.microsoft.com/office/mac/drawingml/2011/main" xmlns="" val="1"/>
             </a:ext>
           </a:extLst>
         </p:spPr>
@@ -5872,7 +5890,7 @@
           <a:effectLst/>
           <a:extLst>
             <a:ext uri="{C572A759-6A51-4108-AA02-DFA0A04FC94B}">
-              <ma14:wrappingTextBoxFlag xmlns="" xmlns:ma14="http://schemas.microsoft.com/office/mac/drawingml/2011/main" val="1"/>
+              <ma14:wrappingTextBoxFlag xmlns:ma14="http://schemas.microsoft.com/office/mac/drawingml/2011/main" xmlns="" val="1"/>
             </a:ext>
           </a:extLst>
         </p:spPr>
@@ -6021,7 +6039,7 @@
           </a:ln>
           <a:extLst>
             <a:ext uri="{C572A759-6A51-4108-AA02-DFA0A04FC94B}">
-              <ma14:wrappingTextBoxFlag xmlns="" xmlns:ma14="http://schemas.microsoft.com/office/mac/drawingml/2011/main" val="1"/>
+              <ma14:wrappingTextBoxFlag xmlns:ma14="http://schemas.microsoft.com/office/mac/drawingml/2011/main" xmlns="" val="1"/>
             </a:ext>
           </a:extLst>
         </p:spPr>
@@ -6129,7 +6147,7 @@
           </a:ln>
           <a:extLst>
             <a:ext uri="{C572A759-6A51-4108-AA02-DFA0A04FC94B}">
-              <ma14:wrappingTextBoxFlag xmlns="" xmlns:ma14="http://schemas.microsoft.com/office/mac/drawingml/2011/main" val="1"/>
+              <ma14:wrappingTextBoxFlag xmlns:ma14="http://schemas.microsoft.com/office/mac/drawingml/2011/main" xmlns="" val="1"/>
             </a:ext>
           </a:extLst>
         </p:spPr>
@@ -6172,7 +6190,7 @@
           </a:ln>
           <a:extLst>
             <a:ext uri="{C572A759-6A51-4108-AA02-DFA0A04FC94B}">
-              <ma14:wrappingTextBoxFlag xmlns="" xmlns:ma14="http://schemas.microsoft.com/office/mac/drawingml/2011/main" val="1"/>
+              <ma14:wrappingTextBoxFlag xmlns:ma14="http://schemas.microsoft.com/office/mac/drawingml/2011/main" xmlns="" val="1"/>
             </a:ext>
           </a:extLst>
         </p:spPr>
@@ -6221,7 +6239,7 @@
           </a:ln>
           <a:extLst>
             <a:ext uri="{C572A759-6A51-4108-AA02-DFA0A04FC94B}">
-              <ma14:wrappingTextBoxFlag xmlns="" xmlns:ma14="http://schemas.microsoft.com/office/mac/drawingml/2011/main" val="1"/>
+              <ma14:wrappingTextBoxFlag xmlns:ma14="http://schemas.microsoft.com/office/mac/drawingml/2011/main" xmlns="" val="1"/>
             </a:ext>
           </a:extLst>
         </p:spPr>
@@ -6306,7 +6324,7 @@
           </a:ln>
           <a:extLst>
             <a:ext uri="{C572A759-6A51-4108-AA02-DFA0A04FC94B}">
-              <ma14:wrappingTextBoxFlag xmlns="" xmlns:ma14="http://schemas.microsoft.com/office/mac/drawingml/2011/main" val="1"/>
+              <ma14:wrappingTextBoxFlag xmlns:ma14="http://schemas.microsoft.com/office/mac/drawingml/2011/main" xmlns="" val="1"/>
             </a:ext>
           </a:extLst>
         </p:spPr>
@@ -6486,7 +6504,7 @@
           </a:ln>
           <a:extLst>
             <a:ext uri="{C572A759-6A51-4108-AA02-DFA0A04FC94B}">
-              <ma14:wrappingTextBoxFlag xmlns="" xmlns:ma14="http://schemas.microsoft.com/office/mac/drawingml/2011/main" val="1"/>
+              <ma14:wrappingTextBoxFlag xmlns:ma14="http://schemas.microsoft.com/office/mac/drawingml/2011/main" xmlns="" val="1"/>
             </a:ext>
           </a:extLst>
         </p:spPr>
@@ -6529,7 +6547,7 @@
           </a:ln>
           <a:extLst>
             <a:ext uri="{C572A759-6A51-4108-AA02-DFA0A04FC94B}">
-              <ma14:wrappingTextBoxFlag xmlns="" xmlns:ma14="http://schemas.microsoft.com/office/mac/drawingml/2011/main" val="1"/>
+              <ma14:wrappingTextBoxFlag xmlns:ma14="http://schemas.microsoft.com/office/mac/drawingml/2011/main" xmlns="" val="1"/>
             </a:ext>
           </a:extLst>
         </p:spPr>
@@ -6568,7 +6586,7 @@
         <p:spPr>
           <a:xfrm>
             <a:off x="205025" y="2164724"/>
-            <a:ext cx="4134600" cy="1489093"/>
+            <a:ext cx="4134600" cy="1754551"/>
           </a:xfrm>
           <a:prstGeom prst="rect">
             <a:avLst/>
@@ -6578,7 +6596,7 @@
           </a:ln>
           <a:extLst>
             <a:ext uri="{C572A759-6A51-4108-AA02-DFA0A04FC94B}">
-              <ma14:wrappingTextBoxFlag xmlns="" xmlns:ma14="http://schemas.microsoft.com/office/mac/drawingml/2011/main" val="1"/>
+              <ma14:wrappingTextBoxFlag xmlns:ma14="http://schemas.microsoft.com/office/mac/drawingml/2011/main" xmlns="" val="1"/>
             </a:ext>
           </a:extLst>
         </p:spPr>
@@ -6606,7 +6624,7 @@
             </a:pPr>
             <a:r>
               <a:rPr lang="en-MY" dirty="0"/>
-              <a:t>Gender demographics are similar for both genders</a:t>
+              <a:t>Gender demographics are quite similar for both genders with female customers being slightly higher</a:t>
             </a:r>
           </a:p>
           <a:p>
@@ -6644,7 +6662,7 @@
           </a:ln>
           <a:extLst>
             <a:ext uri="{C572A759-6A51-4108-AA02-DFA0A04FC94B}">
-              <ma14:wrappingTextBoxFlag xmlns="" xmlns:ma14="http://schemas.microsoft.com/office/mac/drawingml/2011/main" val="1"/>
+              <ma14:wrappingTextBoxFlag xmlns:ma14="http://schemas.microsoft.com/office/mac/drawingml/2011/main" xmlns="" val="1"/>
             </a:ext>
           </a:extLst>
         </p:spPr>
@@ -6672,10 +6690,10 @@
       </p:sp>
       <p:pic>
         <p:nvPicPr>
-          <p:cNvPr id="3" name="Picture 2" descr="Chart, bar chart&#10;&#10;Description automatically generated">
+          <p:cNvPr id="4" name="Picture 3" descr="Chart, bar chart&#10;&#10;Description automatically generated">
             <a:extLst>
               <a:ext uri="{FF2B5EF4-FFF2-40B4-BE49-F238E27FC236}">
-                <a16:creationId xmlns:a16="http://schemas.microsoft.com/office/drawing/2014/main" id="{750C2F79-B83A-4245-832F-B7E54D838115}"/>
+                <a16:creationId xmlns:a16="http://schemas.microsoft.com/office/drawing/2014/main" id="{1440EB9F-30F4-486A-8DFE-387737B61828}"/>
               </a:ext>
             </a:extLst>
           </p:cNvPr>
@@ -6698,8 +6716,8 @@
         </p:blipFill>
         <p:spPr>
           <a:xfrm>
-            <a:off x="5062818" y="1854257"/>
-            <a:ext cx="3813074" cy="2621488"/>
+            <a:off x="5312674" y="1682860"/>
+            <a:ext cx="3457951" cy="2377341"/>
           </a:xfrm>
           <a:prstGeom prst="rect">
             <a:avLst/>
@@ -6793,7 +6811,7 @@
           </a:ln>
           <a:extLst>
             <a:ext uri="{C572A759-6A51-4108-AA02-DFA0A04FC94B}">
-              <ma14:wrappingTextBoxFlag xmlns="" xmlns:ma14="http://schemas.microsoft.com/office/mac/drawingml/2011/main" val="1"/>
+              <ma14:wrappingTextBoxFlag xmlns:ma14="http://schemas.microsoft.com/office/mac/drawingml/2011/main" xmlns="" val="1"/>
             </a:ext>
           </a:extLst>
         </p:spPr>
@@ -6836,7 +6854,7 @@
           </a:ln>
           <a:extLst>
             <a:ext uri="{C572A759-6A51-4108-AA02-DFA0A04FC94B}">
-              <ma14:wrappingTextBoxFlag xmlns="" xmlns:ma14="http://schemas.microsoft.com/office/mac/drawingml/2011/main" val="1"/>
+              <ma14:wrappingTextBoxFlag xmlns:ma14="http://schemas.microsoft.com/office/mac/drawingml/2011/main" xmlns="" val="1"/>
             </a:ext>
           </a:extLst>
         </p:spPr>
@@ -6885,7 +6903,7 @@
           </a:ln>
           <a:extLst>
             <a:ext uri="{C572A759-6A51-4108-AA02-DFA0A04FC94B}">
-              <ma14:wrappingTextBoxFlag xmlns="" xmlns:ma14="http://schemas.microsoft.com/office/mac/drawingml/2011/main" val="1"/>
+              <ma14:wrappingTextBoxFlag xmlns:ma14="http://schemas.microsoft.com/office/mac/drawingml/2011/main" xmlns="" val="1"/>
             </a:ext>
           </a:extLst>
         </p:spPr>
@@ -6951,7 +6969,7 @@
           </a:ln>
           <a:extLst>
             <a:ext uri="{C572A759-6A51-4108-AA02-DFA0A04FC94B}">
-              <ma14:wrappingTextBoxFlag xmlns="" xmlns:ma14="http://schemas.microsoft.com/office/mac/drawingml/2011/main" val="1"/>
+              <ma14:wrappingTextBoxFlag xmlns:ma14="http://schemas.microsoft.com/office/mac/drawingml/2011/main" xmlns="" val="1"/>
             </a:ext>
           </a:extLst>
         </p:spPr>
@@ -7136,7 +7154,7 @@
           </a:ln>
           <a:extLst>
             <a:ext uri="{C572A759-6A51-4108-AA02-DFA0A04FC94B}">
-              <ma14:wrappingTextBoxFlag xmlns="" xmlns:ma14="http://schemas.microsoft.com/office/mac/drawingml/2011/main" val="1"/>
+              <ma14:wrappingTextBoxFlag xmlns:ma14="http://schemas.microsoft.com/office/mac/drawingml/2011/main" xmlns="" val="1"/>
             </a:ext>
           </a:extLst>
         </p:spPr>
@@ -7179,7 +7197,7 @@
           </a:ln>
           <a:extLst>
             <a:ext uri="{C572A759-6A51-4108-AA02-DFA0A04FC94B}">
-              <ma14:wrappingTextBoxFlag xmlns="" xmlns:ma14="http://schemas.microsoft.com/office/mac/drawingml/2011/main" val="1"/>
+              <ma14:wrappingTextBoxFlag xmlns:ma14="http://schemas.microsoft.com/office/mac/drawingml/2011/main" xmlns="" val="1"/>
             </a:ext>
           </a:extLst>
         </p:spPr>
@@ -7228,7 +7246,7 @@
           </a:ln>
           <a:extLst>
             <a:ext uri="{C572A759-6A51-4108-AA02-DFA0A04FC94B}">
-              <ma14:wrappingTextBoxFlag xmlns="" xmlns:ma14="http://schemas.microsoft.com/office/mac/drawingml/2011/main" val="1"/>
+              <ma14:wrappingTextBoxFlag xmlns:ma14="http://schemas.microsoft.com/office/mac/drawingml/2011/main" xmlns="" val="1"/>
             </a:ext>
           </a:extLst>
         </p:spPr>
@@ -7294,7 +7312,7 @@
           </a:ln>
           <a:extLst>
             <a:ext uri="{C572A759-6A51-4108-AA02-DFA0A04FC94B}">
-              <ma14:wrappingTextBoxFlag xmlns="" xmlns:ma14="http://schemas.microsoft.com/office/mac/drawingml/2011/main" val="1"/>
+              <ma14:wrappingTextBoxFlag xmlns:ma14="http://schemas.microsoft.com/office/mac/drawingml/2011/main" xmlns="" val="1"/>
             </a:ext>
           </a:extLst>
         </p:spPr>
@@ -7479,7 +7497,7 @@
           </a:ln>
           <a:extLst>
             <a:ext uri="{C572A759-6A51-4108-AA02-DFA0A04FC94B}">
-              <ma14:wrappingTextBoxFlag xmlns:ma14="http://schemas.microsoft.com/office/mac/drawingml/2011/main" xmlns="" val="1"/>
+              <ma14:wrappingTextBoxFlag xmlns="" xmlns:ma14="http://schemas.microsoft.com/office/mac/drawingml/2011/main" val="1"/>
             </a:ext>
           </a:extLst>
         </p:spPr>
@@ -7522,7 +7540,7 @@
           </a:ln>
           <a:extLst>
             <a:ext uri="{C572A759-6A51-4108-AA02-DFA0A04FC94B}">
-              <ma14:wrappingTextBoxFlag xmlns:ma14="http://schemas.microsoft.com/office/mac/drawingml/2011/main" xmlns="" val="1"/>
+              <ma14:wrappingTextBoxFlag xmlns="" xmlns:ma14="http://schemas.microsoft.com/office/mac/drawingml/2011/main" val="1"/>
             </a:ext>
           </a:extLst>
         </p:spPr>
@@ -7571,7 +7589,7 @@
           </a:ln>
           <a:extLst>
             <a:ext uri="{C572A759-6A51-4108-AA02-DFA0A04FC94B}">
-              <ma14:wrappingTextBoxFlag xmlns:ma14="http://schemas.microsoft.com/office/mac/drawingml/2011/main" xmlns="" val="1"/>
+              <ma14:wrappingTextBoxFlag xmlns="" xmlns:ma14="http://schemas.microsoft.com/office/mac/drawingml/2011/main" val="1"/>
             </a:ext>
           </a:extLst>
         </p:spPr>
@@ -7637,7 +7655,7 @@
           </a:ln>
           <a:extLst>
             <a:ext uri="{C572A759-6A51-4108-AA02-DFA0A04FC94B}">
-              <ma14:wrappingTextBoxFlag xmlns:ma14="http://schemas.microsoft.com/office/mac/drawingml/2011/main" xmlns="" val="1"/>
+              <ma14:wrappingTextBoxFlag xmlns="" xmlns:ma14="http://schemas.microsoft.com/office/mac/drawingml/2011/main" val="1"/>
             </a:ext>
           </a:extLst>
         </p:spPr>
@@ -7786,7 +7804,7 @@
           </a:ln>
           <a:extLst>
             <a:ext uri="{C572A759-6A51-4108-AA02-DFA0A04FC94B}">
-              <ma14:wrappingTextBoxFlag xmlns="" xmlns:ma14="http://schemas.microsoft.com/office/mac/drawingml/2011/main" val="1"/>
+              <ma14:wrappingTextBoxFlag xmlns:ma14="http://schemas.microsoft.com/office/mac/drawingml/2011/main" xmlns="" val="1"/>
             </a:ext>
           </a:extLst>
         </p:spPr>
@@ -7830,7 +7848,7 @@
           </a:ln>
           <a:extLst>
             <a:ext uri="{C572A759-6A51-4108-AA02-DFA0A04FC94B}">
-              <ma14:wrappingTextBoxFlag xmlns="" xmlns:ma14="http://schemas.microsoft.com/office/mac/drawingml/2011/main" val="1"/>
+              <ma14:wrappingTextBoxFlag xmlns:ma14="http://schemas.microsoft.com/office/mac/drawingml/2011/main" xmlns="" val="1"/>
             </a:ext>
           </a:extLst>
         </p:spPr>
@@ -7885,7 +7903,7 @@
           </a:ln>
           <a:extLst>
             <a:ext uri="{C572A759-6A51-4108-AA02-DFA0A04FC94B}">
-              <ma14:wrappingTextBoxFlag xmlns="" xmlns:ma14="http://schemas.microsoft.com/office/mac/drawingml/2011/main" val="1"/>
+              <ma14:wrappingTextBoxFlag xmlns:ma14="http://schemas.microsoft.com/office/mac/drawingml/2011/main" xmlns="" val="1"/>
             </a:ext>
           </a:extLst>
         </p:spPr>
@@ -7950,7 +7968,7 @@
           </a:ln>
           <a:extLst>
             <a:ext uri="{C572A759-6A51-4108-AA02-DFA0A04FC94B}">
-              <ma14:wrappingTextBoxFlag xmlns="" xmlns:ma14="http://schemas.microsoft.com/office/mac/drawingml/2011/main" val="1"/>
+              <ma14:wrappingTextBoxFlag xmlns:ma14="http://schemas.microsoft.com/office/mac/drawingml/2011/main" xmlns="" val="1"/>
             </a:ext>
           </a:extLst>
         </p:spPr>
@@ -7978,10 +7996,10 @@
       </p:sp>
       <p:pic>
         <p:nvPicPr>
-          <p:cNvPr id="7" name="Picture 6" descr="Chart, bar chart&#10;&#10;Description automatically generated">
+          <p:cNvPr id="5" name="Picture 4" descr="Chart, background pattern&#10;&#10;Description automatically generated">
             <a:extLst>
               <a:ext uri="{FF2B5EF4-FFF2-40B4-BE49-F238E27FC236}">
-                <a16:creationId xmlns:a16="http://schemas.microsoft.com/office/drawing/2014/main" id="{61FB8AEF-33CB-47AA-A277-D2807DF20FC2}"/>
+                <a16:creationId xmlns:a16="http://schemas.microsoft.com/office/drawing/2014/main" id="{9908FEC2-1376-45FB-8D51-6F97BCDF7817}"/>
               </a:ext>
             </a:extLst>
           </p:cNvPr>
@@ -8004,8 +8022,8 @@
         </p:blipFill>
         <p:spPr>
           <a:xfrm>
-            <a:off x="4804378" y="1945426"/>
-            <a:ext cx="3966248" cy="2427486"/>
+            <a:off x="4659406" y="1918304"/>
+            <a:ext cx="4230779" cy="2612807"/>
           </a:xfrm>
           <a:prstGeom prst="rect">
             <a:avLst/>

</xml_diff>

<commit_message>
top 1000 customers to target
</commit_message>
<xml_diff>
--- a/02-model-development-slides.pptx
+++ b/02-model-development-slides.pptx
@@ -5,7 +5,7 @@
     <p:sldMasterId id="2147483648" r:id="rId1"/>
   </p:sldMasterIdLst>
   <p:notesMasterIdLst>
-    <p:notesMasterId r:id="rId18"/>
+    <p:notesMasterId r:id="rId19"/>
   </p:notesMasterIdLst>
   <p:sldIdLst>
     <p:sldId id="256" r:id="rId2"/>
@@ -21,9 +21,10 @@
     <p:sldId id="271" r:id="rId12"/>
     <p:sldId id="270" r:id="rId13"/>
     <p:sldId id="269" r:id="rId14"/>
-    <p:sldId id="261" r:id="rId15"/>
-    <p:sldId id="262" r:id="rId16"/>
-    <p:sldId id="263" r:id="rId17"/>
+    <p:sldId id="272" r:id="rId15"/>
+    <p:sldId id="261" r:id="rId16"/>
+    <p:sldId id="262" r:id="rId17"/>
+    <p:sldId id="263" r:id="rId18"/>
   </p:sldIdLst>
   <p:sldSz cx="9144000" cy="5143500" type="screen16x9"/>
   <p:notesSz cx="6858000" cy="9144000"/>
@@ -2024,7 +2025,7 @@
           </a:ln>
           <a:extLst>
             <a:ext uri="{C572A759-6A51-4108-AA02-DFA0A04FC94B}">
-              <ma14:wrappingTextBoxFlag xmlns:ma14="http://schemas.microsoft.com/office/mac/drawingml/2011/main" xmlns="" val="1"/>
+              <ma14:wrappingTextBoxFlag xmlns="" xmlns:ma14="http://schemas.microsoft.com/office/mac/drawingml/2011/main" val="1"/>
             </a:ext>
           </a:extLst>
         </p:spPr>
@@ -2063,7 +2064,7 @@
           </a:ln>
           <a:extLst>
             <a:ext uri="{C572A759-6A51-4108-AA02-DFA0A04FC94B}">
-              <ma14:wrappingTextBoxFlag xmlns:ma14="http://schemas.microsoft.com/office/mac/drawingml/2011/main" xmlns="" val="1"/>
+              <ma14:wrappingTextBoxFlag xmlns="" xmlns:ma14="http://schemas.microsoft.com/office/mac/drawingml/2011/main" val="1"/>
             </a:ext>
           </a:extLst>
         </p:spPr>
@@ -3123,7 +3124,7 @@
           </a:ln>
           <a:extLst>
             <a:ext uri="{C572A759-6A51-4108-AA02-DFA0A04FC94B}">
-              <ma14:wrappingTextBoxFlag xmlns:ma14="http://schemas.microsoft.com/office/mac/drawingml/2011/main" xmlns="" val="1"/>
+              <ma14:wrappingTextBoxFlag xmlns="" xmlns:ma14="http://schemas.microsoft.com/office/mac/drawingml/2011/main" val="1"/>
             </a:ext>
           </a:extLst>
         </p:spPr>
@@ -3170,7 +3171,7 @@
           </a:ln>
           <a:extLst>
             <a:ext uri="{C572A759-6A51-4108-AA02-DFA0A04FC94B}">
-              <ma14:wrappingTextBoxFlag xmlns:ma14="http://schemas.microsoft.com/office/mac/drawingml/2011/main" xmlns="" val="1"/>
+              <ma14:wrappingTextBoxFlag xmlns="" xmlns:ma14="http://schemas.microsoft.com/office/mac/drawingml/2011/main" val="1"/>
             </a:ext>
           </a:extLst>
         </p:spPr>
@@ -3244,7 +3245,7 @@
           </a:ln>
           <a:extLst>
             <a:ext uri="{C572A759-6A51-4108-AA02-DFA0A04FC94B}">
-              <ma14:wrappingTextBoxFlag xmlns:ma14="http://schemas.microsoft.com/office/mac/drawingml/2011/main" xmlns="" val="1"/>
+              <ma14:wrappingTextBoxFlag xmlns="" xmlns:ma14="http://schemas.microsoft.com/office/mac/drawingml/2011/main" val="1"/>
             </a:ext>
           </a:extLst>
         </p:spPr>
@@ -3267,6 +3268,7 @@
           </a:lstStyle>
           <a:p>
             <a:r>
+              <a:rPr dirty="0"/>
               <a:t>[Division Name] - [Engagement Manager], [Senior Consultant], [Junior Consultant]</a:t>
             </a:r>
           </a:p>
@@ -3294,7 +3296,7 @@
           </a:ln>
           <a:extLst>
             <a:ext uri="{C572A759-6A51-4108-AA02-DFA0A04FC94B}">
-              <ma14:wrappingTextBoxFlag xmlns:ma14="http://schemas.microsoft.com/office/mac/drawingml/2011/main" xmlns="" val="1"/>
+              <ma14:wrappingTextBoxFlag xmlns="" xmlns:ma14="http://schemas.microsoft.com/office/mac/drawingml/2011/main" val="1"/>
             </a:ext>
           </a:extLst>
         </p:spPr>
@@ -3402,7 +3404,7 @@
           </a:ln>
           <a:extLst>
             <a:ext uri="{C572A759-6A51-4108-AA02-DFA0A04FC94B}">
-              <ma14:wrappingTextBoxFlag xmlns:ma14="http://schemas.microsoft.com/office/mac/drawingml/2011/main" xmlns="" val="1"/>
+              <ma14:wrappingTextBoxFlag xmlns="" xmlns:ma14="http://schemas.microsoft.com/office/mac/drawingml/2011/main" val="1"/>
             </a:ext>
           </a:extLst>
         </p:spPr>
@@ -3446,7 +3448,7 @@
           </a:ln>
           <a:extLst>
             <a:ext uri="{C572A759-6A51-4108-AA02-DFA0A04FC94B}">
-              <ma14:wrappingTextBoxFlag xmlns:ma14="http://schemas.microsoft.com/office/mac/drawingml/2011/main" xmlns="" val="1"/>
+              <ma14:wrappingTextBoxFlag xmlns="" xmlns:ma14="http://schemas.microsoft.com/office/mac/drawingml/2011/main" val="1"/>
             </a:ext>
           </a:extLst>
         </p:spPr>
@@ -3495,7 +3497,7 @@
           </a:ln>
           <a:extLst>
             <a:ext uri="{C572A759-6A51-4108-AA02-DFA0A04FC94B}">
-              <ma14:wrappingTextBoxFlag xmlns:ma14="http://schemas.microsoft.com/office/mac/drawingml/2011/main" xmlns="" val="1"/>
+              <ma14:wrappingTextBoxFlag xmlns="" xmlns:ma14="http://schemas.microsoft.com/office/mac/drawingml/2011/main" val="1"/>
             </a:ext>
           </a:extLst>
         </p:spPr>
@@ -3571,7 +3573,7 @@
           </a:ln>
           <a:extLst>
             <a:ext uri="{C572A759-6A51-4108-AA02-DFA0A04FC94B}">
-              <ma14:wrappingTextBoxFlag xmlns:ma14="http://schemas.microsoft.com/office/mac/drawingml/2011/main" xmlns="" val="1"/>
+              <ma14:wrappingTextBoxFlag xmlns="" xmlns:ma14="http://schemas.microsoft.com/office/mac/drawingml/2011/main" val="1"/>
             </a:ext>
           </a:extLst>
         </p:spPr>
@@ -3715,7 +3717,7 @@
           </a:ln>
           <a:extLst>
             <a:ext uri="{C572A759-6A51-4108-AA02-DFA0A04FC94B}">
-              <ma14:wrappingTextBoxFlag xmlns="" xmlns:ma14="http://schemas.microsoft.com/office/mac/drawingml/2011/main" val="1"/>
+              <ma14:wrappingTextBoxFlag xmlns:ma14="http://schemas.microsoft.com/office/mac/drawingml/2011/main" xmlns="" val="1"/>
             </a:ext>
           </a:extLst>
         </p:spPr>
@@ -3759,7 +3761,7 @@
           </a:ln>
           <a:extLst>
             <a:ext uri="{C572A759-6A51-4108-AA02-DFA0A04FC94B}">
-              <ma14:wrappingTextBoxFlag xmlns="" xmlns:ma14="http://schemas.microsoft.com/office/mac/drawingml/2011/main" val="1"/>
+              <ma14:wrappingTextBoxFlag xmlns:ma14="http://schemas.microsoft.com/office/mac/drawingml/2011/main" xmlns="" val="1"/>
             </a:ext>
           </a:extLst>
         </p:spPr>
@@ -3807,7 +3809,7 @@
           </a:ln>
           <a:extLst>
             <a:ext uri="{C572A759-6A51-4108-AA02-DFA0A04FC94B}">
-              <ma14:wrappingTextBoxFlag xmlns="" xmlns:ma14="http://schemas.microsoft.com/office/mac/drawingml/2011/main" val="1"/>
+              <ma14:wrappingTextBoxFlag xmlns:ma14="http://schemas.microsoft.com/office/mac/drawingml/2011/main" xmlns="" val="1"/>
             </a:ext>
           </a:extLst>
         </p:spPr>
@@ -3873,7 +3875,7 @@
           </a:ln>
           <a:extLst>
             <a:ext uri="{C572A759-6A51-4108-AA02-DFA0A04FC94B}">
-              <ma14:wrappingTextBoxFlag xmlns="" xmlns:ma14="http://schemas.microsoft.com/office/mac/drawingml/2011/main" val="1"/>
+              <ma14:wrappingTextBoxFlag xmlns:ma14="http://schemas.microsoft.com/office/mac/drawingml/2011/main" xmlns="" val="1"/>
             </a:ext>
           </a:extLst>
         </p:spPr>
@@ -4022,7 +4024,7 @@
           </a:ln>
           <a:extLst>
             <a:ext uri="{C572A759-6A51-4108-AA02-DFA0A04FC94B}">
-              <ma14:wrappingTextBoxFlag xmlns="" xmlns:ma14="http://schemas.microsoft.com/office/mac/drawingml/2011/main" val="1"/>
+              <ma14:wrappingTextBoxFlag xmlns:ma14="http://schemas.microsoft.com/office/mac/drawingml/2011/main" xmlns="" val="1"/>
             </a:ext>
           </a:extLst>
         </p:spPr>
@@ -4066,7 +4068,7 @@
           </a:ln>
           <a:extLst>
             <a:ext uri="{C572A759-6A51-4108-AA02-DFA0A04FC94B}">
-              <ma14:wrappingTextBoxFlag xmlns="" xmlns:ma14="http://schemas.microsoft.com/office/mac/drawingml/2011/main" val="1"/>
+              <ma14:wrappingTextBoxFlag xmlns:ma14="http://schemas.microsoft.com/office/mac/drawingml/2011/main" xmlns="" val="1"/>
             </a:ext>
           </a:extLst>
         </p:spPr>
@@ -4114,7 +4116,7 @@
           </a:ln>
           <a:extLst>
             <a:ext uri="{C572A759-6A51-4108-AA02-DFA0A04FC94B}">
-              <ma14:wrappingTextBoxFlag xmlns="" xmlns:ma14="http://schemas.microsoft.com/office/mac/drawingml/2011/main" val="1"/>
+              <ma14:wrappingTextBoxFlag xmlns:ma14="http://schemas.microsoft.com/office/mac/drawingml/2011/main" xmlns="" val="1"/>
             </a:ext>
           </a:extLst>
         </p:spPr>
@@ -4190,7 +4192,7 @@
           </a:ln>
           <a:extLst>
             <a:ext uri="{C572A759-6A51-4108-AA02-DFA0A04FC94B}">
-              <ma14:wrappingTextBoxFlag xmlns="" xmlns:ma14="http://schemas.microsoft.com/office/mac/drawingml/2011/main" val="1"/>
+              <ma14:wrappingTextBoxFlag xmlns:ma14="http://schemas.microsoft.com/office/mac/drawingml/2011/main" xmlns="" val="1"/>
             </a:ext>
           </a:extLst>
         </p:spPr>
@@ -4339,7 +4341,7 @@
           </a:ln>
           <a:extLst>
             <a:ext uri="{C572A759-6A51-4108-AA02-DFA0A04FC94B}">
-              <ma14:wrappingTextBoxFlag xmlns="" xmlns:ma14="http://schemas.microsoft.com/office/mac/drawingml/2011/main" val="1"/>
+              <ma14:wrappingTextBoxFlag xmlns:ma14="http://schemas.microsoft.com/office/mac/drawingml/2011/main" xmlns="" val="1"/>
             </a:ext>
           </a:extLst>
         </p:spPr>
@@ -4383,7 +4385,7 @@
           </a:ln>
           <a:extLst>
             <a:ext uri="{C572A759-6A51-4108-AA02-DFA0A04FC94B}">
-              <ma14:wrappingTextBoxFlag xmlns="" xmlns:ma14="http://schemas.microsoft.com/office/mac/drawingml/2011/main" val="1"/>
+              <ma14:wrappingTextBoxFlag xmlns:ma14="http://schemas.microsoft.com/office/mac/drawingml/2011/main" xmlns="" val="1"/>
             </a:ext>
           </a:extLst>
         </p:spPr>
@@ -4432,7 +4434,7 @@
           </a:ln>
           <a:extLst>
             <a:ext uri="{C572A759-6A51-4108-AA02-DFA0A04FC94B}">
-              <ma14:wrappingTextBoxFlag xmlns="" xmlns:ma14="http://schemas.microsoft.com/office/mac/drawingml/2011/main" val="1"/>
+              <ma14:wrappingTextBoxFlag xmlns:ma14="http://schemas.microsoft.com/office/mac/drawingml/2011/main" xmlns="" val="1"/>
             </a:ext>
           </a:extLst>
         </p:spPr>
@@ -4564,7 +4566,7 @@
           </a:ln>
           <a:extLst>
             <a:ext uri="{C572A759-6A51-4108-AA02-DFA0A04FC94B}">
-              <ma14:wrappingTextBoxFlag xmlns="" xmlns:ma14="http://schemas.microsoft.com/office/mac/drawingml/2011/main" val="1"/>
+              <ma14:wrappingTextBoxFlag xmlns:ma14="http://schemas.microsoft.com/office/mac/drawingml/2011/main" xmlns="" val="1"/>
             </a:ext>
           </a:extLst>
         </p:spPr>
@@ -4745,8 +4747,8 @@
         </p:nvSpPr>
         <p:spPr>
           <a:xfrm>
-            <a:off x="205025" y="1083299"/>
-            <a:ext cx="8565600" cy="920086"/>
+            <a:off x="205025" y="733876"/>
+            <a:ext cx="8565600" cy="508184"/>
           </a:xfrm>
           <a:prstGeom prst="rect">
             <a:avLst/>
@@ -4779,25 +4781,30 @@
           </a:lstStyle>
           <a:p>
             <a:r>
-              <a:t>Place headline insight or information here. This should be the most important point for this slide.</a:t>
-            </a:r>
-          </a:p>
-        </p:txBody>
-      </p:sp>
-      <p:sp>
-        <p:nvSpPr>
-          <p:cNvPr id="151" name="Shape 100"/>
+              <a:rPr lang="en-MY" dirty="0"/>
+              <a:t>Top 1000 to Target from Existing Customer List</a:t>
+            </a:r>
+            <a:endParaRPr dirty="0"/>
+          </a:p>
+        </p:txBody>
+      </p:sp>
+      <p:sp>
+        <p:nvSpPr>
+          <p:cNvPr id="155" name="Note: The data and information in this document is reflective of a hypothetical situation and client. This document is to be used for KPMG Virtual Internship purposes only."/>
           <p:cNvSpPr/>
           <p:nvPr/>
         </p:nvSpPr>
         <p:spPr>
           <a:xfrm>
-            <a:off x="205025" y="2164724"/>
-            <a:ext cx="4134600" cy="436851"/>
-          </a:xfrm>
-          <a:prstGeom prst="rect">
-            <a:avLst/>
-          </a:prstGeom>
+            <a:off x="-6201" y="-6350"/>
+            <a:ext cx="9175601" cy="238700"/>
+          </a:xfrm>
+          <a:prstGeom prst="rect">
+            <a:avLst/>
+          </a:prstGeom>
+          <a:solidFill>
+            <a:schemeClr val="accent3"/>
+          </a:solidFill>
           <a:ln w="12700">
             <a:miter lim="400000"/>
           </a:ln>
@@ -4808,7 +4815,1039 @@
           </a:extLst>
         </p:spPr>
         <p:txBody>
+          <a:bodyPr lIns="45719" rIns="45719" anchor="ctr"/>
+          <a:lstStyle/>
+          <a:p>
+            <a:pPr defTabSz="457200">
+              <a:defRPr sz="500" b="1">
+                <a:latin typeface="Calibri"/>
+                <a:ea typeface="Calibri"/>
+                <a:cs typeface="Calibri"/>
+                <a:sym typeface="Calibri"/>
+              </a:defRPr>
+            </a:pPr>
+            <a:r>
+              <a:t>       Note: </a:t>
+            </a:r>
+            <a:r>
+              <a:rPr b="0"/>
+              <a:t>The data and information in this document is reflective of a hypothetical situation and client. This document is to be used for KPMG Virtual Internship purposes only. </a:t>
+            </a:r>
+          </a:p>
+        </p:txBody>
+      </p:sp>
+      <p:graphicFrame>
+        <p:nvGraphicFramePr>
+          <p:cNvPr id="3" name="Table 3">
+            <a:extLst>
+              <a:ext uri="{FF2B5EF4-FFF2-40B4-BE49-F238E27FC236}">
+                <a16:creationId xmlns:a16="http://schemas.microsoft.com/office/drawing/2014/main" id="{DBE6AA3E-6698-4761-B800-F3E2530B602E}"/>
+              </a:ext>
+            </a:extLst>
+          </p:cNvPr>
+          <p:cNvGraphicFramePr>
+            <a:graphicFrameLocks noGrp="1"/>
+          </p:cNvGraphicFramePr>
+          <p:nvPr>
+            <p:extLst>
+              <p:ext uri="{D42A27DB-BD31-4B8C-83A1-F6EECF244321}">
+                <p14:modId xmlns:p14="http://schemas.microsoft.com/office/powerpoint/2010/main" val="1849122244"/>
+              </p:ext>
+            </p:extLst>
+          </p:nvPr>
+        </p:nvGraphicFramePr>
+        <p:xfrm>
+          <a:off x="1524812" y="1174825"/>
+          <a:ext cx="5926026" cy="3901440"/>
+        </p:xfrm>
+        <a:graphic>
+          <a:graphicData uri="http://schemas.openxmlformats.org/drawingml/2006/table">
+            <a:tbl>
+              <a:tblPr firstRow="1" bandRow="1">
+                <a:tableStyleId>{5940675A-B579-460E-94D1-54222C63F5DA}</a:tableStyleId>
+              </a:tblPr>
+              <a:tblGrid>
+                <a:gridCol w="1975342">
+                  <a:extLst>
+                    <a:ext uri="{9D8B030D-6E8A-4147-A177-3AD203B41FA5}">
+                      <a16:colId xmlns:a16="http://schemas.microsoft.com/office/drawing/2014/main" val="1468290402"/>
+                    </a:ext>
+                  </a:extLst>
+                </a:gridCol>
+                <a:gridCol w="1975342">
+                  <a:extLst>
+                    <a:ext uri="{9D8B030D-6E8A-4147-A177-3AD203B41FA5}">
+                      <a16:colId xmlns:a16="http://schemas.microsoft.com/office/drawing/2014/main" val="89015908"/>
+                    </a:ext>
+                  </a:extLst>
+                </a:gridCol>
+                <a:gridCol w="1975342">
+                  <a:extLst>
+                    <a:ext uri="{9D8B030D-6E8A-4147-A177-3AD203B41FA5}">
+                      <a16:colId xmlns:a16="http://schemas.microsoft.com/office/drawing/2014/main" val="866697464"/>
+                    </a:ext>
+                  </a:extLst>
+                </a:gridCol>
+              </a:tblGrid>
+              <a:tr h="201188">
+                <a:tc>
+                  <a:txBody>
+                    <a:bodyPr/>
+                    <a:lstStyle/>
+                    <a:p>
+                      <a:r>
+                        <a:rPr lang="en-MY" dirty="0"/>
+                        <a:t>Segment Name</a:t>
+                      </a:r>
+                    </a:p>
+                  </a:txBody>
+                  <a:tcPr/>
+                </a:tc>
+                <a:tc>
+                  <a:txBody>
+                    <a:bodyPr/>
+                    <a:lstStyle/>
+                    <a:p>
+                      <a:r>
+                        <a:rPr lang="en-MY" dirty="0"/>
+                        <a:t>Count</a:t>
+                      </a:r>
+                    </a:p>
+                  </a:txBody>
+                  <a:tcPr/>
+                </a:tc>
+                <a:tc>
+                  <a:txBody>
+                    <a:bodyPr/>
+                    <a:lstStyle/>
+                    <a:p>
+                      <a:r>
+                        <a:rPr lang="en-MY" dirty="0"/>
+                        <a:t>Cumulative Count</a:t>
+                      </a:r>
+                    </a:p>
+                  </a:txBody>
+                  <a:tcPr/>
+                </a:tc>
+                <a:extLst>
+                  <a:ext uri="{0D108BD9-81ED-4DB2-BD59-A6C34878D82A}">
+                    <a16:rowId xmlns:a16="http://schemas.microsoft.com/office/drawing/2014/main" val="2633179105"/>
+                  </a:ext>
+                </a:extLst>
+              </a:tr>
+              <a:tr h="201188">
+                <a:tc>
+                  <a:txBody>
+                    <a:bodyPr/>
+                    <a:lstStyle/>
+                    <a:p>
+                      <a:r>
+                        <a:rPr lang="en-MY" dirty="0"/>
+                        <a:t>Core Tier 1</a:t>
+                      </a:r>
+                    </a:p>
+                  </a:txBody>
+                  <a:tcPr/>
+                </a:tc>
+                <a:tc>
+                  <a:txBody>
+                    <a:bodyPr/>
+                    <a:lstStyle/>
+                    <a:p>
+                      <a:r>
+                        <a:rPr lang="en-MY" dirty="0"/>
+                        <a:t>210</a:t>
+                      </a:r>
+                    </a:p>
+                  </a:txBody>
+                  <a:tcPr/>
+                </a:tc>
+                <a:tc>
+                  <a:txBody>
+                    <a:bodyPr/>
+                    <a:lstStyle/>
+                    <a:p>
+                      <a:r>
+                        <a:rPr lang="en-MY" dirty="0"/>
+                        <a:t>210</a:t>
+                      </a:r>
+                    </a:p>
+                  </a:txBody>
+                  <a:tcPr/>
+                </a:tc>
+                <a:extLst>
+                  <a:ext uri="{0D108BD9-81ED-4DB2-BD59-A6C34878D82A}">
+                    <a16:rowId xmlns:a16="http://schemas.microsoft.com/office/drawing/2014/main" val="2874987175"/>
+                  </a:ext>
+                </a:extLst>
+              </a:tr>
+              <a:tr h="201188">
+                <a:tc>
+                  <a:txBody>
+                    <a:bodyPr/>
+                    <a:lstStyle/>
+                    <a:p>
+                      <a:pPr marL="0" marR="0" lvl="0" indent="0" algn="r" defTabSz="914400" rtl="0" eaLnBrk="1" fontAlgn="auto" latinLnBrk="0" hangingPunct="1">
+                        <a:lnSpc>
+                          <a:spcPct val="100000"/>
+                        </a:lnSpc>
+                        <a:spcBef>
+                          <a:spcPts val="0"/>
+                        </a:spcBef>
+                        <a:spcAft>
+                          <a:spcPts val="0"/>
+                        </a:spcAft>
+                        <a:buClrTx/>
+                        <a:buSzTx/>
+                        <a:buFontTx/>
+                        <a:buNone/>
+                        <a:tabLst/>
+                        <a:defRPr/>
+                      </a:pPr>
+                      <a:r>
+                        <a:rPr lang="en-MY" dirty="0"/>
+                        <a:t>Core Tier 2</a:t>
+                      </a:r>
+                    </a:p>
+                  </a:txBody>
+                  <a:tcPr/>
+                </a:tc>
+                <a:tc>
+                  <a:txBody>
+                    <a:bodyPr/>
+                    <a:lstStyle/>
+                    <a:p>
+                      <a:r>
+                        <a:rPr lang="en-MY" dirty="0"/>
+                        <a:t>52</a:t>
+                      </a:r>
+                    </a:p>
+                  </a:txBody>
+                  <a:tcPr/>
+                </a:tc>
+                <a:tc>
+                  <a:txBody>
+                    <a:bodyPr/>
+                    <a:lstStyle/>
+                    <a:p>
+                      <a:r>
+                        <a:rPr lang="en-MY" dirty="0"/>
+                        <a:t>262</a:t>
+                      </a:r>
+                    </a:p>
+                  </a:txBody>
+                  <a:tcPr/>
+                </a:tc>
+                <a:extLst>
+                  <a:ext uri="{0D108BD9-81ED-4DB2-BD59-A6C34878D82A}">
+                    <a16:rowId xmlns:a16="http://schemas.microsoft.com/office/drawing/2014/main" val="330035954"/>
+                  </a:ext>
+                </a:extLst>
+              </a:tr>
+              <a:tr h="201188">
+                <a:tc>
+                  <a:txBody>
+                    <a:bodyPr/>
+                    <a:lstStyle/>
+                    <a:p>
+                      <a:r>
+                        <a:rPr lang="en-MY" dirty="0"/>
+                        <a:t>Core Tier 3</a:t>
+                      </a:r>
+                    </a:p>
+                  </a:txBody>
+                  <a:tcPr/>
+                </a:tc>
+                <a:tc>
+                  <a:txBody>
+                    <a:bodyPr/>
+                    <a:lstStyle/>
+                    <a:p>
+                      <a:r>
+                        <a:rPr lang="en-MY" dirty="0"/>
+                        <a:t>59</a:t>
+                      </a:r>
+                    </a:p>
+                  </a:txBody>
+                  <a:tcPr/>
+                </a:tc>
+                <a:tc>
+                  <a:txBody>
+                    <a:bodyPr/>
+                    <a:lstStyle/>
+                    <a:p>
+                      <a:r>
+                        <a:rPr lang="en-MY" dirty="0"/>
+                        <a:t>321</a:t>
+                      </a:r>
+                    </a:p>
+                  </a:txBody>
+                  <a:tcPr/>
+                </a:tc>
+                <a:extLst>
+                  <a:ext uri="{0D108BD9-81ED-4DB2-BD59-A6C34878D82A}">
+                    <a16:rowId xmlns:a16="http://schemas.microsoft.com/office/drawing/2014/main" val="2692307992"/>
+                  </a:ext>
+                </a:extLst>
+              </a:tr>
+              <a:tr h="201188">
+                <a:tc>
+                  <a:txBody>
+                    <a:bodyPr/>
+                    <a:lstStyle/>
+                    <a:p>
+                      <a:r>
+                        <a:rPr lang="en-MY" dirty="0"/>
+                        <a:t>Core Tier 4</a:t>
+                      </a:r>
+                    </a:p>
+                  </a:txBody>
+                  <a:tcPr/>
+                </a:tc>
+                <a:tc>
+                  <a:txBody>
+                    <a:bodyPr/>
+                    <a:lstStyle/>
+                    <a:p>
+                      <a:r>
+                        <a:rPr lang="en-MY" dirty="0"/>
+                        <a:t>25</a:t>
+                      </a:r>
+                    </a:p>
+                  </a:txBody>
+                  <a:tcPr/>
+                </a:tc>
+                <a:tc>
+                  <a:txBody>
+                    <a:bodyPr/>
+                    <a:lstStyle/>
+                    <a:p>
+                      <a:r>
+                        <a:rPr lang="en-MY" dirty="0"/>
+                        <a:t>346</a:t>
+                      </a:r>
+                    </a:p>
+                  </a:txBody>
+                  <a:tcPr/>
+                </a:tc>
+                <a:extLst>
+                  <a:ext uri="{0D108BD9-81ED-4DB2-BD59-A6C34878D82A}">
+                    <a16:rowId xmlns:a16="http://schemas.microsoft.com/office/drawing/2014/main" val="3258336727"/>
+                  </a:ext>
+                </a:extLst>
+              </a:tr>
+              <a:tr h="201188">
+                <a:tc>
+                  <a:txBody>
+                    <a:bodyPr/>
+                    <a:lstStyle/>
+                    <a:p>
+                      <a:r>
+                        <a:rPr lang="en-MY" dirty="0"/>
+                        <a:t>Loyal Tier 1</a:t>
+                      </a:r>
+                    </a:p>
+                  </a:txBody>
+                  <a:tcPr/>
+                </a:tc>
+                <a:tc>
+                  <a:txBody>
+                    <a:bodyPr/>
+                    <a:lstStyle/>
+                    <a:p>
+                      <a:r>
+                        <a:rPr lang="en-MY" dirty="0"/>
+                        <a:t>42</a:t>
+                      </a:r>
+                    </a:p>
+                  </a:txBody>
+                  <a:tcPr/>
+                </a:tc>
+                <a:tc>
+                  <a:txBody>
+                    <a:bodyPr/>
+                    <a:lstStyle/>
+                    <a:p>
+                      <a:r>
+                        <a:rPr lang="en-MY" dirty="0"/>
+                        <a:t>388</a:t>
+                      </a:r>
+                    </a:p>
+                  </a:txBody>
+                  <a:tcPr/>
+                </a:tc>
+                <a:extLst>
+                  <a:ext uri="{0D108BD9-81ED-4DB2-BD59-A6C34878D82A}">
+                    <a16:rowId xmlns:a16="http://schemas.microsoft.com/office/drawing/2014/main" val="3579758176"/>
+                  </a:ext>
+                </a:extLst>
+              </a:tr>
+              <a:tr h="201188">
+                <a:tc>
+                  <a:txBody>
+                    <a:bodyPr/>
+                    <a:lstStyle/>
+                    <a:p>
+                      <a:r>
+                        <a:rPr lang="en-MY" dirty="0"/>
+                        <a:t>Loyal Tier 2</a:t>
+                      </a:r>
+                    </a:p>
+                  </a:txBody>
+                  <a:tcPr/>
+                </a:tc>
+                <a:tc>
+                  <a:txBody>
+                    <a:bodyPr/>
+                    <a:lstStyle/>
+                    <a:p>
+                      <a:r>
+                        <a:rPr lang="en-MY" dirty="0"/>
+                        <a:t>69</a:t>
+                      </a:r>
+                    </a:p>
+                  </a:txBody>
+                  <a:tcPr/>
+                </a:tc>
+                <a:tc>
+                  <a:txBody>
+                    <a:bodyPr/>
+                    <a:lstStyle/>
+                    <a:p>
+                      <a:r>
+                        <a:rPr lang="en-MY" dirty="0"/>
+                        <a:t>457</a:t>
+                      </a:r>
+                    </a:p>
+                  </a:txBody>
+                  <a:tcPr/>
+                </a:tc>
+                <a:extLst>
+                  <a:ext uri="{0D108BD9-81ED-4DB2-BD59-A6C34878D82A}">
+                    <a16:rowId xmlns:a16="http://schemas.microsoft.com/office/drawing/2014/main" val="3056113254"/>
+                  </a:ext>
+                </a:extLst>
+              </a:tr>
+              <a:tr h="201188">
+                <a:tc>
+                  <a:txBody>
+                    <a:bodyPr/>
+                    <a:lstStyle/>
+                    <a:p>
+                      <a:r>
+                        <a:rPr lang="en-MY" dirty="0"/>
+                        <a:t>Loyal Tier 3</a:t>
+                      </a:r>
+                    </a:p>
+                  </a:txBody>
+                  <a:tcPr/>
+                </a:tc>
+                <a:tc>
+                  <a:txBody>
+                    <a:bodyPr/>
+                    <a:lstStyle/>
+                    <a:p>
+                      <a:r>
+                        <a:rPr lang="en-MY" dirty="0"/>
+                        <a:t>3</a:t>
+                      </a:r>
+                    </a:p>
+                  </a:txBody>
+                  <a:tcPr/>
+                </a:tc>
+                <a:tc>
+                  <a:txBody>
+                    <a:bodyPr/>
+                    <a:lstStyle/>
+                    <a:p>
+                      <a:r>
+                        <a:rPr lang="en-MY" dirty="0"/>
+                        <a:t>460</a:t>
+                      </a:r>
+                    </a:p>
+                  </a:txBody>
+                  <a:tcPr/>
+                </a:tc>
+                <a:extLst>
+                  <a:ext uri="{0D108BD9-81ED-4DB2-BD59-A6C34878D82A}">
+                    <a16:rowId xmlns:a16="http://schemas.microsoft.com/office/drawing/2014/main" val="966403480"/>
+                  </a:ext>
+                </a:extLst>
+              </a:tr>
+              <a:tr h="201188">
+                <a:tc>
+                  <a:txBody>
+                    <a:bodyPr/>
+                    <a:lstStyle/>
+                    <a:p>
+                      <a:r>
+                        <a:rPr lang="en-MY" dirty="0"/>
+                        <a:t>Whales Tier 1</a:t>
+                      </a:r>
+                    </a:p>
+                  </a:txBody>
+                  <a:tcPr/>
+                </a:tc>
+                <a:tc>
+                  <a:txBody>
+                    <a:bodyPr/>
+                    <a:lstStyle/>
+                    <a:p>
+                      <a:r>
+                        <a:rPr lang="en-MY" dirty="0"/>
+                        <a:t>50</a:t>
+                      </a:r>
+                    </a:p>
+                  </a:txBody>
+                  <a:tcPr/>
+                </a:tc>
+                <a:tc>
+                  <a:txBody>
+                    <a:bodyPr/>
+                    <a:lstStyle/>
+                    <a:p>
+                      <a:r>
+                        <a:rPr lang="en-MY" dirty="0"/>
+                        <a:t>510</a:t>
+                      </a:r>
+                    </a:p>
+                  </a:txBody>
+                  <a:tcPr/>
+                </a:tc>
+                <a:extLst>
+                  <a:ext uri="{0D108BD9-81ED-4DB2-BD59-A6C34878D82A}">
+                    <a16:rowId xmlns:a16="http://schemas.microsoft.com/office/drawing/2014/main" val="3288561521"/>
+                  </a:ext>
+                </a:extLst>
+              </a:tr>
+              <a:tr h="201188">
+                <a:tc>
+                  <a:txBody>
+                    <a:bodyPr/>
+                    <a:lstStyle/>
+                    <a:p>
+                      <a:pPr marL="0" marR="0" lvl="0" indent="0" algn="r" defTabSz="914400" rtl="0" eaLnBrk="1" fontAlgn="auto" latinLnBrk="0" hangingPunct="1">
+                        <a:lnSpc>
+                          <a:spcPct val="100000"/>
+                        </a:lnSpc>
+                        <a:spcBef>
+                          <a:spcPts val="0"/>
+                        </a:spcBef>
+                        <a:spcAft>
+                          <a:spcPts val="0"/>
+                        </a:spcAft>
+                        <a:buClrTx/>
+                        <a:buSzTx/>
+                        <a:buFontTx/>
+                        <a:buNone/>
+                        <a:tabLst/>
+                        <a:defRPr/>
+                      </a:pPr>
+                      <a:r>
+                        <a:rPr lang="en-MY" dirty="0"/>
+                        <a:t>Whales Tier 2</a:t>
+                      </a:r>
+                    </a:p>
+                  </a:txBody>
+                  <a:tcPr/>
+                </a:tc>
+                <a:tc>
+                  <a:txBody>
+                    <a:bodyPr/>
+                    <a:lstStyle/>
+                    <a:p>
+                      <a:r>
+                        <a:rPr lang="en-MY" dirty="0"/>
+                        <a:t>27</a:t>
+                      </a:r>
+                    </a:p>
+                  </a:txBody>
+                  <a:tcPr/>
+                </a:tc>
+                <a:tc>
+                  <a:txBody>
+                    <a:bodyPr/>
+                    <a:lstStyle/>
+                    <a:p>
+                      <a:r>
+                        <a:rPr lang="en-MY" dirty="0"/>
+                        <a:t>537</a:t>
+                      </a:r>
+                    </a:p>
+                  </a:txBody>
+                  <a:tcPr/>
+                </a:tc>
+                <a:extLst>
+                  <a:ext uri="{0D108BD9-81ED-4DB2-BD59-A6C34878D82A}">
+                    <a16:rowId xmlns:a16="http://schemas.microsoft.com/office/drawing/2014/main" val="3619277217"/>
+                  </a:ext>
+                </a:extLst>
+              </a:tr>
+              <a:tr h="201188">
+                <a:tc>
+                  <a:txBody>
+                    <a:bodyPr/>
+                    <a:lstStyle/>
+                    <a:p>
+                      <a:r>
+                        <a:rPr lang="en-MY" dirty="0"/>
+                        <a:t>Becoming Loyal Tier 1</a:t>
+                      </a:r>
+                    </a:p>
+                  </a:txBody>
+                  <a:tcPr/>
+                </a:tc>
+                <a:tc>
+                  <a:txBody>
+                    <a:bodyPr/>
+                    <a:lstStyle/>
+                    <a:p>
+                      <a:r>
+                        <a:rPr lang="en-MY" dirty="0"/>
+                        <a:t>126</a:t>
+                      </a:r>
+                    </a:p>
+                  </a:txBody>
+                  <a:tcPr/>
+                </a:tc>
+                <a:tc>
+                  <a:txBody>
+                    <a:bodyPr/>
+                    <a:lstStyle/>
+                    <a:p>
+                      <a:r>
+                        <a:rPr lang="en-MY" dirty="0"/>
+                        <a:t>663</a:t>
+                      </a:r>
+                    </a:p>
+                  </a:txBody>
+                  <a:tcPr/>
+                </a:tc>
+                <a:extLst>
+                  <a:ext uri="{0D108BD9-81ED-4DB2-BD59-A6C34878D82A}">
+                    <a16:rowId xmlns:a16="http://schemas.microsoft.com/office/drawing/2014/main" val="1340148631"/>
+                  </a:ext>
+                </a:extLst>
+              </a:tr>
+              <a:tr h="201188">
+                <a:tc>
+                  <a:txBody>
+                    <a:bodyPr/>
+                    <a:lstStyle/>
+                    <a:p>
+                      <a:r>
+                        <a:rPr lang="en-MY" dirty="0"/>
+                        <a:t>Becoming Loyal Tier 2</a:t>
+                      </a:r>
+                    </a:p>
+                  </a:txBody>
+                  <a:tcPr/>
+                </a:tc>
+                <a:tc>
+                  <a:txBody>
+                    <a:bodyPr/>
+                    <a:lstStyle/>
+                    <a:p>
+                      <a:r>
+                        <a:rPr lang="en-MY" dirty="0"/>
+                        <a:t>113</a:t>
+                      </a:r>
+                    </a:p>
+                  </a:txBody>
+                  <a:tcPr/>
+                </a:tc>
+                <a:tc>
+                  <a:txBody>
+                    <a:bodyPr/>
+                    <a:lstStyle/>
+                    <a:p>
+                      <a:r>
+                        <a:rPr lang="en-MY" dirty="0"/>
+                        <a:t>776</a:t>
+                      </a:r>
+                    </a:p>
+                  </a:txBody>
+                  <a:tcPr/>
+                </a:tc>
+                <a:extLst>
+                  <a:ext uri="{0D108BD9-81ED-4DB2-BD59-A6C34878D82A}">
+                    <a16:rowId xmlns:a16="http://schemas.microsoft.com/office/drawing/2014/main" val="3121745653"/>
+                  </a:ext>
+                </a:extLst>
+              </a:tr>
+              <a:tr h="201188">
+                <a:tc>
+                  <a:txBody>
+                    <a:bodyPr/>
+                    <a:lstStyle/>
+                    <a:p>
+                      <a:r>
+                        <a:rPr lang="en-MY" dirty="0"/>
+                        <a:t>Becoming Loyal Tier 3</a:t>
+                      </a:r>
+                    </a:p>
+                  </a:txBody>
+                  <a:tcPr/>
+                </a:tc>
+                <a:tc>
+                  <a:txBody>
+                    <a:bodyPr/>
+                    <a:lstStyle/>
+                    <a:p>
+                      <a:r>
+                        <a:rPr lang="en-MY" dirty="0"/>
+                        <a:t>26</a:t>
+                      </a:r>
+                    </a:p>
+                  </a:txBody>
+                  <a:tcPr/>
+                </a:tc>
+                <a:tc>
+                  <a:txBody>
+                    <a:bodyPr/>
+                    <a:lstStyle/>
+                    <a:p>
+                      <a:r>
+                        <a:rPr lang="en-MY" dirty="0"/>
+                        <a:t>802</a:t>
+                      </a:r>
+                    </a:p>
+                  </a:txBody>
+                  <a:tcPr/>
+                </a:tc>
+                <a:extLst>
+                  <a:ext uri="{0D108BD9-81ED-4DB2-BD59-A6C34878D82A}">
+                    <a16:rowId xmlns:a16="http://schemas.microsoft.com/office/drawing/2014/main" val="889065576"/>
+                  </a:ext>
+                </a:extLst>
+              </a:tr>
+              <a:tr h="201188">
+                <a:tc>
+                  <a:txBody>
+                    <a:bodyPr/>
+                    <a:lstStyle/>
+                    <a:p>
+                      <a:r>
+                        <a:rPr lang="en-MY" dirty="0"/>
+                        <a:t>Rookies Tier 1</a:t>
+                      </a:r>
+                    </a:p>
+                  </a:txBody>
+                  <a:tcPr/>
+                </a:tc>
+                <a:tc>
+                  <a:txBody>
+                    <a:bodyPr/>
+                    <a:lstStyle/>
+                    <a:p>
+                      <a:r>
+                        <a:rPr lang="en-MY" dirty="0"/>
+                        <a:t>17</a:t>
+                      </a:r>
+                    </a:p>
+                  </a:txBody>
+                  <a:tcPr/>
+                </a:tc>
+                <a:tc>
+                  <a:txBody>
+                    <a:bodyPr/>
+                    <a:lstStyle/>
+                    <a:p>
+                      <a:r>
+                        <a:rPr lang="en-MY" dirty="0"/>
+                        <a:t>819</a:t>
+                      </a:r>
+                    </a:p>
+                  </a:txBody>
+                  <a:tcPr/>
+                </a:tc>
+                <a:extLst>
+                  <a:ext uri="{0D108BD9-81ED-4DB2-BD59-A6C34878D82A}">
+                    <a16:rowId xmlns:a16="http://schemas.microsoft.com/office/drawing/2014/main" val="1002962020"/>
+                  </a:ext>
+                </a:extLst>
+              </a:tr>
+              <a:tr h="201188">
+                <a:tc>
+                  <a:txBody>
+                    <a:bodyPr/>
+                    <a:lstStyle/>
+                    <a:p>
+                      <a:r>
+                        <a:rPr lang="en-MY" dirty="0"/>
+                        <a:t>Rookies Tier 2</a:t>
+                      </a:r>
+                    </a:p>
+                  </a:txBody>
+                  <a:tcPr/>
+                </a:tc>
+                <a:tc>
+                  <a:txBody>
+                    <a:bodyPr/>
+                    <a:lstStyle/>
+                    <a:p>
+                      <a:r>
+                        <a:rPr lang="en-MY" dirty="0"/>
+                        <a:t>69</a:t>
+                      </a:r>
+                    </a:p>
+                  </a:txBody>
+                  <a:tcPr/>
+                </a:tc>
+                <a:tc>
+                  <a:txBody>
+                    <a:bodyPr/>
+                    <a:lstStyle/>
+                    <a:p>
+                      <a:r>
+                        <a:rPr lang="en-MY" dirty="0"/>
+                        <a:t>888</a:t>
+                      </a:r>
+                    </a:p>
+                  </a:txBody>
+                  <a:tcPr/>
+                </a:tc>
+                <a:extLst>
+                  <a:ext uri="{0D108BD9-81ED-4DB2-BD59-A6C34878D82A}">
+                    <a16:rowId xmlns:a16="http://schemas.microsoft.com/office/drawing/2014/main" val="903185571"/>
+                  </a:ext>
+                </a:extLst>
+              </a:tr>
+              <a:tr h="201188">
+                <a:tc>
+                  <a:txBody>
+                    <a:bodyPr/>
+                    <a:lstStyle/>
+                    <a:p>
+                      <a:r>
+                        <a:rPr lang="en-MY" dirty="0"/>
+                        <a:t>Rookies Tier 3</a:t>
+                      </a:r>
+                    </a:p>
+                  </a:txBody>
+                  <a:tcPr/>
+                </a:tc>
+                <a:tc>
+                  <a:txBody>
+                    <a:bodyPr/>
+                    <a:lstStyle/>
+                    <a:p>
+                      <a:r>
+                        <a:rPr lang="en-MY" dirty="0"/>
+                        <a:t>114</a:t>
+                      </a:r>
+                    </a:p>
+                  </a:txBody>
+                  <a:tcPr/>
+                </a:tc>
+                <a:tc>
+                  <a:txBody>
+                    <a:bodyPr/>
+                    <a:lstStyle/>
+                    <a:p>
+                      <a:r>
+                        <a:rPr lang="en-MY" dirty="0"/>
+                        <a:t>1002</a:t>
+                      </a:r>
+                    </a:p>
+                  </a:txBody>
+                  <a:tcPr/>
+                </a:tc>
+                <a:extLst>
+                  <a:ext uri="{0D108BD9-81ED-4DB2-BD59-A6C34878D82A}">
+                    <a16:rowId xmlns:a16="http://schemas.microsoft.com/office/drawing/2014/main" val="1310932163"/>
+                  </a:ext>
+                </a:extLst>
+              </a:tr>
+            </a:tbl>
+          </a:graphicData>
+        </a:graphic>
+      </p:graphicFrame>
+    </p:spTree>
+    <p:extLst>
+      <p:ext uri="{BB962C8B-B14F-4D97-AF65-F5344CB8AC3E}">
+        <p14:creationId xmlns:p14="http://schemas.microsoft.com/office/powerpoint/2010/main" val="869402702"/>
+      </p:ext>
+    </p:extLst>
+  </p:cSld>
+  <p:clrMapOvr>
+    <a:masterClrMapping/>
+  </p:clrMapOvr>
+  <p:transition spd="med"/>
+</p:sld>
+</file>
+
+<file path=ppt/slides/slide15.xml><?xml version="1.0" encoding="utf-8"?>
+<p:sld xmlns:a="http://schemas.openxmlformats.org/drawingml/2006/main" xmlns:r="http://schemas.openxmlformats.org/officeDocument/2006/relationships" xmlns:p="http://schemas.openxmlformats.org/presentationml/2006/main">
+  <p:cSld>
+    <p:spTree>
+      <p:nvGrpSpPr>
+        <p:cNvPr id="1" name=""/>
+        <p:cNvGrpSpPr/>
+        <p:nvPr/>
+      </p:nvGrpSpPr>
+      <p:grpSpPr>
+        <a:xfrm>
+          <a:off x="0" y="0"/>
+          <a:ext cx="0" cy="0"/>
+          <a:chOff x="0" y="0"/>
+          <a:chExt cx="0" cy="0"/>
+        </a:xfrm>
+      </p:grpSpPr>
+      <p:sp>
+        <p:nvSpPr>
+          <p:cNvPr id="148" name="Shape 97"/>
+          <p:cNvSpPr/>
+          <p:nvPr/>
+        </p:nvSpPr>
+        <p:spPr>
+          <a:xfrm>
+            <a:off x="-15501" y="-19475"/>
+            <a:ext cx="9191402" cy="840000"/>
+          </a:xfrm>
+          <a:prstGeom prst="rect">
+            <a:avLst/>
+          </a:prstGeom>
+          <a:gradFill>
+            <a:gsLst>
+              <a:gs pos="0">
+                <a:srgbClr val="1077D2"/>
+              </a:gs>
+              <a:gs pos="100000">
+                <a:srgbClr val="093153"/>
+              </a:gs>
+            </a:gsLst>
+            <a:lin ang="12000143"/>
+          </a:gradFill>
+          <a:ln w="12700">
+            <a:miter lim="400000"/>
+          </a:ln>
+        </p:spPr>
+        <p:txBody>
+          <a:bodyPr lIns="45719" rIns="45719" anchor="ctr"/>
+          <a:lstStyle/>
+          <a:p>
+            <a:endParaRPr/>
+          </a:p>
+        </p:txBody>
+      </p:sp>
+      <p:sp>
+        <p:nvSpPr>
+          <p:cNvPr id="149" name="Shape 98"/>
+          <p:cNvSpPr/>
+          <p:nvPr/>
+        </p:nvSpPr>
+        <p:spPr>
+          <a:xfrm>
+            <a:off x="205025" y="263974"/>
+            <a:ext cx="8565600" cy="758742"/>
+          </a:xfrm>
+          <a:prstGeom prst="rect">
+            <a:avLst/>
+          </a:prstGeom>
+          <a:ln w="12700">
+            <a:miter lim="400000"/>
+          </a:ln>
+          <a:extLst>
+            <a:ext uri="{C572A759-6A51-4108-AA02-DFA0A04FC94B}">
+              <ma14:wrappingTextBoxFlag xmlns="" xmlns:ma14="http://schemas.microsoft.com/office/mac/drawingml/2011/main" val="1"/>
+            </a:ext>
+          </a:extLst>
+        </p:spPr>
+        <p:txBody>
           <a:bodyPr lIns="91424" tIns="91424" rIns="91424" bIns="91424">
+            <a:spAutoFit/>
+          </a:bodyPr>
+          <a:lstStyle>
+            <a:lvl1pPr>
+              <a:defRPr sz="2000" b="1">
+                <a:solidFill>
+                  <a:srgbClr val="FFFFFF"/>
+                </a:solidFill>
+              </a:defRPr>
+            </a:lvl1pPr>
+          </a:lstStyle>
+          <a:p>
+            <a:r>
+              <a:t>Interpretation</a:t>
+            </a:r>
+          </a:p>
+        </p:txBody>
+      </p:sp>
+      <p:sp>
+        <p:nvSpPr>
+          <p:cNvPr id="150" name="Shape 99"/>
+          <p:cNvSpPr/>
+          <p:nvPr/>
+        </p:nvSpPr>
+        <p:spPr>
+          <a:xfrm>
+            <a:off x="205025" y="1083299"/>
+            <a:ext cx="8565600" cy="508184"/>
+          </a:xfrm>
+          <a:prstGeom prst="rect">
+            <a:avLst/>
+          </a:prstGeom>
+          <a:ln w="12700">
+            <a:miter lim="400000"/>
+          </a:ln>
+          <a:extLst>
+            <a:ext uri="{C572A759-6A51-4108-AA02-DFA0A04FC94B}">
+              <ma14:wrappingTextBoxFlag xmlns="" xmlns:ma14="http://schemas.microsoft.com/office/mac/drawingml/2011/main" val="1"/>
+            </a:ext>
+          </a:extLst>
+        </p:spPr>
+        <p:txBody>
+          <a:bodyPr lIns="91424" tIns="91424" rIns="91424" bIns="91424">
+            <a:spAutoFit/>
+          </a:bodyPr>
+          <a:lstStyle>
+            <a:lvl1pPr>
+              <a:lnSpc>
+                <a:spcPct val="115000"/>
+              </a:lnSpc>
+              <a:defRPr sz="2000" b="1">
+                <a:latin typeface="Open Sans"/>
+                <a:ea typeface="Open Sans"/>
+                <a:cs typeface="Open Sans"/>
+                <a:sym typeface="Open Sans"/>
+              </a:defRPr>
+            </a:lvl1pPr>
+          </a:lstStyle>
+          <a:p>
+            <a:r>
+              <a:rPr lang="en-MY" dirty="0"/>
+              <a:t>Top 1000 Customers to Target from New Customer List</a:t>
+            </a:r>
+            <a:endParaRPr dirty="0"/>
+          </a:p>
+        </p:txBody>
+      </p:sp>
+      <p:sp>
+        <p:nvSpPr>
+          <p:cNvPr id="151" name="Shape 100"/>
+          <p:cNvSpPr/>
+          <p:nvPr/>
+        </p:nvSpPr>
+        <p:spPr>
+          <a:xfrm>
+            <a:off x="376292" y="1827203"/>
+            <a:ext cx="8407816" cy="1489093"/>
+          </a:xfrm>
+          <a:prstGeom prst="rect">
+            <a:avLst/>
+          </a:prstGeom>
+          <a:ln w="12700">
+            <a:miter lim="400000"/>
+          </a:ln>
+          <a:extLst>
+            <a:ext uri="{C572A759-6A51-4108-AA02-DFA0A04FC94B}">
+              <ma14:wrappingTextBoxFlag xmlns="" xmlns:ma14="http://schemas.microsoft.com/office/mac/drawingml/2011/main" val="1"/>
+            </a:ext>
+          </a:extLst>
+        </p:spPr>
+        <p:txBody>
+          <a:bodyPr wrap="square" lIns="91424" tIns="91424" rIns="91424" bIns="91424">
             <a:spAutoFit/>
           </a:bodyPr>
           <a:lstStyle>
@@ -4825,113 +5864,28 @@
             </a:lvl1pPr>
           </a:lstStyle>
           <a:p>
-            <a:r>
-              <a:t>Place any information about this point here.</a:t>
-            </a:r>
-          </a:p>
-        </p:txBody>
-      </p:sp>
-      <p:grpSp>
-        <p:nvGrpSpPr>
-          <p:cNvPr id="154" name="Shape 101"/>
-          <p:cNvGrpSpPr/>
-          <p:nvPr/>
-        </p:nvGrpSpPr>
-        <p:grpSpPr>
-          <a:xfrm>
-            <a:off x="4969974" y="2164724"/>
-            <a:ext cx="3800702" cy="2649302"/>
-            <a:chOff x="0" y="0"/>
-            <a:chExt cx="3800700" cy="2649300"/>
-          </a:xfrm>
-        </p:grpSpPr>
-        <p:sp>
-          <p:nvSpPr>
-            <p:cNvPr id="152" name="Rectangle"/>
-            <p:cNvSpPr/>
-            <p:nvPr/>
-          </p:nvSpPr>
-          <p:spPr>
-            <a:xfrm>
-              <a:off x="-1" y="-1"/>
-              <a:ext cx="3800702" cy="2649302"/>
-            </a:xfrm>
-            <a:prstGeom prst="rect">
-              <a:avLst/>
-            </a:prstGeom>
-            <a:solidFill>
-              <a:srgbClr val="EEEEEE"/>
-            </a:solidFill>
-            <a:ln w="12700" cap="flat">
-              <a:noFill/>
-              <a:miter lim="400000"/>
-            </a:ln>
-            <a:effectLst/>
-          </p:spPr>
-          <p:txBody>
-            <a:bodyPr wrap="square" lIns="45719" tIns="45719" rIns="45719" bIns="45719" numCol="1" anchor="ctr">
-              <a:noAutofit/>
-            </a:bodyPr>
-            <a:lstStyle/>
-            <a:p>
-              <a:pPr algn="ctr">
-                <a:defRPr>
-                  <a:solidFill>
-                    <a:srgbClr val="666666"/>
-                  </a:solidFill>
-                </a:defRPr>
-              </a:pPr>
-              <a:endParaRPr/>
-            </a:p>
-          </p:txBody>
-        </p:sp>
-        <p:sp>
-          <p:nvSpPr>
-            <p:cNvPr id="153" name="Place any supporting images, graphs, data or extra text here."/>
-            <p:cNvSpPr/>
-            <p:nvPr/>
-          </p:nvSpPr>
-          <p:spPr>
-            <a:xfrm>
-              <a:off x="-1" y="1032933"/>
-              <a:ext cx="3800702" cy="583434"/>
-            </a:xfrm>
-            <a:prstGeom prst="rect">
-              <a:avLst/>
-            </a:prstGeom>
-            <a:noFill/>
-            <a:ln w="12700" cap="flat">
-              <a:noFill/>
-              <a:miter lim="400000"/>
-            </a:ln>
-            <a:effectLst/>
-            <a:extLst>
-              <a:ext uri="{C572A759-6A51-4108-AA02-DFA0A04FC94B}">
-                <ma14:wrappingTextBoxFlag xmlns:ma14="http://schemas.microsoft.com/office/mac/drawingml/2011/main" xmlns="" val="1"/>
-              </a:ext>
-            </a:extLst>
-          </p:spPr>
-          <p:txBody>
-            <a:bodyPr wrap="square" lIns="91424" tIns="91424" rIns="91424" bIns="91424" numCol="1" anchor="ctr">
-              <a:spAutoFit/>
-            </a:bodyPr>
-            <a:lstStyle>
-              <a:lvl1pPr algn="ctr">
-                <a:defRPr>
-                  <a:solidFill>
-                    <a:srgbClr val="666666"/>
-                  </a:solidFill>
-                </a:defRPr>
-              </a:lvl1pPr>
-            </a:lstStyle>
-            <a:p>
-              <a:r>
-                <a:t>Place any supporting images, graphs, data or extra text here.</a:t>
-              </a:r>
-            </a:p>
-          </p:txBody>
-        </p:sp>
-      </p:grpSp>
+            <a:pPr marL="285750" indent="-285750">
+              <a:buFont typeface="Arial" panose="020B0604020202020204" pitchFamily="34" charset="0"/>
+              <a:buChar char="•"/>
+            </a:pPr>
+            <a:r>
+              <a:rPr lang="en-MY" dirty="0"/>
+              <a:t>Same analysis can be done on the new customer list once more transaction data is received over time</a:t>
+            </a:r>
+          </a:p>
+          <a:p>
+            <a:pPr marL="285750" indent="-285750">
+              <a:buFont typeface="Arial" panose="020B0604020202020204" pitchFamily="34" charset="0"/>
+              <a:buChar char="•"/>
+            </a:pPr>
+            <a:r>
+              <a:rPr lang="en-MY" dirty="0"/>
+              <a:t>Using the same approach on the company’s transaction data of existing customers, new customers can be segmented the same way to accurately determine who to best target to maximise revenue</a:t>
+            </a:r>
+            <a:endParaRPr dirty="0"/>
+          </a:p>
+        </p:txBody>
+      </p:sp>
       <p:sp>
         <p:nvSpPr>
           <p:cNvPr id="155" name="Note: The data and information in this document is reflective of a hypothetical situation and client. This document is to be used for KPMG Virtual Internship purposes only."/>
@@ -4954,7 +5908,7 @@
           </a:ln>
           <a:extLst>
             <a:ext uri="{C572A759-6A51-4108-AA02-DFA0A04FC94B}">
-              <ma14:wrappingTextBoxFlag xmlns:ma14="http://schemas.microsoft.com/office/mac/drawingml/2011/main" xmlns="" val="1"/>
+              <ma14:wrappingTextBoxFlag xmlns="" xmlns:ma14="http://schemas.microsoft.com/office/mac/drawingml/2011/main" val="1"/>
             </a:ext>
           </a:extLst>
         </p:spPr>
@@ -4989,7 +5943,7 @@
 </p:sld>
 </file>
 
-<file path=ppt/slides/slide15.xml><?xml version="1.0" encoding="utf-8"?>
+<file path=ppt/slides/slide16.xml><?xml version="1.0" encoding="utf-8"?>
 <p:sld xmlns:a="http://schemas.openxmlformats.org/drawingml/2006/main" xmlns:r="http://schemas.openxmlformats.org/officeDocument/2006/relationships" xmlns:p="http://schemas.openxmlformats.org/presentationml/2006/main">
   <p:cSld>
     <p:spTree>
@@ -5099,7 +6053,7 @@
           </a:ln>
           <a:extLst>
             <a:ext uri="{C572A759-6A51-4108-AA02-DFA0A04FC94B}">
-              <ma14:wrappingTextBoxFlag xmlns:ma14="http://schemas.microsoft.com/office/mac/drawingml/2011/main" xmlns="" val="1"/>
+              <ma14:wrappingTextBoxFlag xmlns="" xmlns:ma14="http://schemas.microsoft.com/office/mac/drawingml/2011/main" val="1"/>
             </a:ext>
           </a:extLst>
         </p:spPr>
@@ -5149,7 +6103,7 @@
           </a:ln>
           <a:extLst>
             <a:ext uri="{C572A759-6A51-4108-AA02-DFA0A04FC94B}">
-              <ma14:wrappingTextBoxFlag xmlns:ma14="http://schemas.microsoft.com/office/mac/drawingml/2011/main" xmlns="" val="1"/>
+              <ma14:wrappingTextBoxFlag xmlns="" xmlns:ma14="http://schemas.microsoft.com/office/mac/drawingml/2011/main" val="1"/>
             </a:ext>
           </a:extLst>
         </p:spPr>
@@ -5184,7 +6138,7 @@
 </p:sld>
 </file>
 
-<file path=ppt/slides/slide16.xml><?xml version="1.0" encoding="utf-8"?>
+<file path=ppt/slides/slide17.xml><?xml version="1.0" encoding="utf-8"?>
 <p:sld xmlns:a="http://schemas.openxmlformats.org/drawingml/2006/main" xmlns:r="http://schemas.openxmlformats.org/officeDocument/2006/relationships" xmlns:p="http://schemas.openxmlformats.org/presentationml/2006/main">
   <p:cSld>
     <p:spTree>
@@ -5257,7 +6211,7 @@
           </a:ln>
           <a:extLst>
             <a:ext uri="{C572A759-6A51-4108-AA02-DFA0A04FC94B}">
-              <ma14:wrappingTextBoxFlag xmlns:ma14="http://schemas.microsoft.com/office/mac/drawingml/2011/main" xmlns="" val="1"/>
+              <ma14:wrappingTextBoxFlag xmlns="" xmlns:ma14="http://schemas.microsoft.com/office/mac/drawingml/2011/main" val="1"/>
             </a:ext>
           </a:extLst>
         </p:spPr>
@@ -5300,7 +6254,7 @@
           </a:ln>
           <a:extLst>
             <a:ext uri="{C572A759-6A51-4108-AA02-DFA0A04FC94B}">
-              <ma14:wrappingTextBoxFlag xmlns:ma14="http://schemas.microsoft.com/office/mac/drawingml/2011/main" xmlns="" val="1"/>
+              <ma14:wrappingTextBoxFlag xmlns="" xmlns:ma14="http://schemas.microsoft.com/office/mac/drawingml/2011/main" val="1"/>
             </a:ext>
           </a:extLst>
         </p:spPr>
@@ -5350,7 +6304,7 @@
           </a:ln>
           <a:extLst>
             <a:ext uri="{C572A759-6A51-4108-AA02-DFA0A04FC94B}">
-              <ma14:wrappingTextBoxFlag xmlns:ma14="http://schemas.microsoft.com/office/mac/drawingml/2011/main" xmlns="" val="1"/>
+              <ma14:wrappingTextBoxFlag xmlns="" xmlns:ma14="http://schemas.microsoft.com/office/mac/drawingml/2011/main" val="1"/>
             </a:ext>
           </a:extLst>
         </p:spPr>
@@ -5458,7 +6412,7 @@
           </a:ln>
           <a:extLst>
             <a:ext uri="{C572A759-6A51-4108-AA02-DFA0A04FC94B}">
-              <ma14:wrappingTextBoxFlag xmlns:ma14="http://schemas.microsoft.com/office/mac/drawingml/2011/main" xmlns="" val="1"/>
+              <ma14:wrappingTextBoxFlag xmlns="" xmlns:ma14="http://schemas.microsoft.com/office/mac/drawingml/2011/main" val="1"/>
             </a:ext>
           </a:extLst>
         </p:spPr>
@@ -5501,7 +6455,7 @@
           </a:ln>
           <a:extLst>
             <a:ext uri="{C572A759-6A51-4108-AA02-DFA0A04FC94B}">
-              <ma14:wrappingTextBoxFlag xmlns:ma14="http://schemas.microsoft.com/office/mac/drawingml/2011/main" xmlns="" val="1"/>
+              <ma14:wrappingTextBoxFlag xmlns="" xmlns:ma14="http://schemas.microsoft.com/office/mac/drawingml/2011/main" val="1"/>
             </a:ext>
           </a:extLst>
         </p:spPr>
@@ -5618,7 +6572,7 @@
           </a:ln>
           <a:extLst>
             <a:ext uri="{C572A759-6A51-4108-AA02-DFA0A04FC94B}">
-              <ma14:wrappingTextBoxFlag xmlns:ma14="http://schemas.microsoft.com/office/mac/drawingml/2011/main" xmlns="" val="1"/>
+              <ma14:wrappingTextBoxFlag xmlns="" xmlns:ma14="http://schemas.microsoft.com/office/mac/drawingml/2011/main" val="1"/>
             </a:ext>
           </a:extLst>
         </p:spPr>
@@ -5726,7 +6680,7 @@
           </a:ln>
           <a:extLst>
             <a:ext uri="{C572A759-6A51-4108-AA02-DFA0A04FC94B}">
-              <ma14:wrappingTextBoxFlag xmlns:ma14="http://schemas.microsoft.com/office/mac/drawingml/2011/main" xmlns="" val="1"/>
+              <ma14:wrappingTextBoxFlag xmlns="" xmlns:ma14="http://schemas.microsoft.com/office/mac/drawingml/2011/main" val="1"/>
             </a:ext>
           </a:extLst>
         </p:spPr>
@@ -5769,7 +6723,7 @@
           </a:ln>
           <a:extLst>
             <a:ext uri="{C572A759-6A51-4108-AA02-DFA0A04FC94B}">
-              <ma14:wrappingTextBoxFlag xmlns:ma14="http://schemas.microsoft.com/office/mac/drawingml/2011/main" xmlns="" val="1"/>
+              <ma14:wrappingTextBoxFlag xmlns="" xmlns:ma14="http://schemas.microsoft.com/office/mac/drawingml/2011/main" val="1"/>
             </a:ext>
           </a:extLst>
         </p:spPr>
@@ -5818,7 +6772,7 @@
           </a:ln>
           <a:extLst>
             <a:ext uri="{C572A759-6A51-4108-AA02-DFA0A04FC94B}">
-              <ma14:wrappingTextBoxFlag xmlns:ma14="http://schemas.microsoft.com/office/mac/drawingml/2011/main" xmlns="" val="1"/>
+              <ma14:wrappingTextBoxFlag xmlns="" xmlns:ma14="http://schemas.microsoft.com/office/mac/drawingml/2011/main" val="1"/>
             </a:ext>
           </a:extLst>
         </p:spPr>
@@ -5890,7 +6844,7 @@
           <a:effectLst/>
           <a:extLst>
             <a:ext uri="{C572A759-6A51-4108-AA02-DFA0A04FC94B}">
-              <ma14:wrappingTextBoxFlag xmlns:ma14="http://schemas.microsoft.com/office/mac/drawingml/2011/main" xmlns="" val="1"/>
+              <ma14:wrappingTextBoxFlag xmlns="" xmlns:ma14="http://schemas.microsoft.com/office/mac/drawingml/2011/main" val="1"/>
             </a:ext>
           </a:extLst>
         </p:spPr>
@@ -6039,7 +6993,7 @@
           </a:ln>
           <a:extLst>
             <a:ext uri="{C572A759-6A51-4108-AA02-DFA0A04FC94B}">
-              <ma14:wrappingTextBoxFlag xmlns:ma14="http://schemas.microsoft.com/office/mac/drawingml/2011/main" xmlns="" val="1"/>
+              <ma14:wrappingTextBoxFlag xmlns="" xmlns:ma14="http://schemas.microsoft.com/office/mac/drawingml/2011/main" val="1"/>
             </a:ext>
           </a:extLst>
         </p:spPr>
@@ -6147,7 +7101,7 @@
           </a:ln>
           <a:extLst>
             <a:ext uri="{C572A759-6A51-4108-AA02-DFA0A04FC94B}">
-              <ma14:wrappingTextBoxFlag xmlns:ma14="http://schemas.microsoft.com/office/mac/drawingml/2011/main" xmlns="" val="1"/>
+              <ma14:wrappingTextBoxFlag xmlns="" xmlns:ma14="http://schemas.microsoft.com/office/mac/drawingml/2011/main" val="1"/>
             </a:ext>
           </a:extLst>
         </p:spPr>
@@ -6190,7 +7144,7 @@
           </a:ln>
           <a:extLst>
             <a:ext uri="{C572A759-6A51-4108-AA02-DFA0A04FC94B}">
-              <ma14:wrappingTextBoxFlag xmlns:ma14="http://schemas.microsoft.com/office/mac/drawingml/2011/main" xmlns="" val="1"/>
+              <ma14:wrappingTextBoxFlag xmlns="" xmlns:ma14="http://schemas.microsoft.com/office/mac/drawingml/2011/main" val="1"/>
             </a:ext>
           </a:extLst>
         </p:spPr>
@@ -6239,7 +7193,7 @@
           </a:ln>
           <a:extLst>
             <a:ext uri="{C572A759-6A51-4108-AA02-DFA0A04FC94B}">
-              <ma14:wrappingTextBoxFlag xmlns:ma14="http://schemas.microsoft.com/office/mac/drawingml/2011/main" xmlns="" val="1"/>
+              <ma14:wrappingTextBoxFlag xmlns="" xmlns:ma14="http://schemas.microsoft.com/office/mac/drawingml/2011/main" val="1"/>
             </a:ext>
           </a:extLst>
         </p:spPr>
@@ -6324,7 +7278,7 @@
           </a:ln>
           <a:extLst>
             <a:ext uri="{C572A759-6A51-4108-AA02-DFA0A04FC94B}">
-              <ma14:wrappingTextBoxFlag xmlns:ma14="http://schemas.microsoft.com/office/mac/drawingml/2011/main" xmlns="" val="1"/>
+              <ma14:wrappingTextBoxFlag xmlns="" xmlns:ma14="http://schemas.microsoft.com/office/mac/drawingml/2011/main" val="1"/>
             </a:ext>
           </a:extLst>
         </p:spPr>
@@ -6504,7 +7458,7 @@
           </a:ln>
           <a:extLst>
             <a:ext uri="{C572A759-6A51-4108-AA02-DFA0A04FC94B}">
-              <ma14:wrappingTextBoxFlag xmlns:ma14="http://schemas.microsoft.com/office/mac/drawingml/2011/main" xmlns="" val="1"/>
+              <ma14:wrappingTextBoxFlag xmlns="" xmlns:ma14="http://schemas.microsoft.com/office/mac/drawingml/2011/main" val="1"/>
             </a:ext>
           </a:extLst>
         </p:spPr>
@@ -6547,7 +7501,7 @@
           </a:ln>
           <a:extLst>
             <a:ext uri="{C572A759-6A51-4108-AA02-DFA0A04FC94B}">
-              <ma14:wrappingTextBoxFlag xmlns:ma14="http://schemas.microsoft.com/office/mac/drawingml/2011/main" xmlns="" val="1"/>
+              <ma14:wrappingTextBoxFlag xmlns="" xmlns:ma14="http://schemas.microsoft.com/office/mac/drawingml/2011/main" val="1"/>
             </a:ext>
           </a:extLst>
         </p:spPr>
@@ -6596,7 +7550,7 @@
           </a:ln>
           <a:extLst>
             <a:ext uri="{C572A759-6A51-4108-AA02-DFA0A04FC94B}">
-              <ma14:wrappingTextBoxFlag xmlns:ma14="http://schemas.microsoft.com/office/mac/drawingml/2011/main" xmlns="" val="1"/>
+              <ma14:wrappingTextBoxFlag xmlns="" xmlns:ma14="http://schemas.microsoft.com/office/mac/drawingml/2011/main" val="1"/>
             </a:ext>
           </a:extLst>
         </p:spPr>
@@ -6662,7 +7616,7 @@
           </a:ln>
           <a:extLst>
             <a:ext uri="{C572A759-6A51-4108-AA02-DFA0A04FC94B}">
-              <ma14:wrappingTextBoxFlag xmlns:ma14="http://schemas.microsoft.com/office/mac/drawingml/2011/main" xmlns="" val="1"/>
+              <ma14:wrappingTextBoxFlag xmlns="" xmlns:ma14="http://schemas.microsoft.com/office/mac/drawingml/2011/main" val="1"/>
             </a:ext>
           </a:extLst>
         </p:spPr>
@@ -6811,7 +7765,7 @@
           </a:ln>
           <a:extLst>
             <a:ext uri="{C572A759-6A51-4108-AA02-DFA0A04FC94B}">
-              <ma14:wrappingTextBoxFlag xmlns:ma14="http://schemas.microsoft.com/office/mac/drawingml/2011/main" xmlns="" val="1"/>
+              <ma14:wrappingTextBoxFlag xmlns="" xmlns:ma14="http://schemas.microsoft.com/office/mac/drawingml/2011/main" val="1"/>
             </a:ext>
           </a:extLst>
         </p:spPr>
@@ -6854,7 +7808,7 @@
           </a:ln>
           <a:extLst>
             <a:ext uri="{C572A759-6A51-4108-AA02-DFA0A04FC94B}">
-              <ma14:wrappingTextBoxFlag xmlns:ma14="http://schemas.microsoft.com/office/mac/drawingml/2011/main" xmlns="" val="1"/>
+              <ma14:wrappingTextBoxFlag xmlns="" xmlns:ma14="http://schemas.microsoft.com/office/mac/drawingml/2011/main" val="1"/>
             </a:ext>
           </a:extLst>
         </p:spPr>
@@ -6903,7 +7857,7 @@
           </a:ln>
           <a:extLst>
             <a:ext uri="{C572A759-6A51-4108-AA02-DFA0A04FC94B}">
-              <ma14:wrappingTextBoxFlag xmlns:ma14="http://schemas.microsoft.com/office/mac/drawingml/2011/main" xmlns="" val="1"/>
+              <ma14:wrappingTextBoxFlag xmlns="" xmlns:ma14="http://schemas.microsoft.com/office/mac/drawingml/2011/main" val="1"/>
             </a:ext>
           </a:extLst>
         </p:spPr>
@@ -6969,7 +7923,7 @@
           </a:ln>
           <a:extLst>
             <a:ext uri="{C572A759-6A51-4108-AA02-DFA0A04FC94B}">
-              <ma14:wrappingTextBoxFlag xmlns:ma14="http://schemas.microsoft.com/office/mac/drawingml/2011/main" xmlns="" val="1"/>
+              <ma14:wrappingTextBoxFlag xmlns="" xmlns:ma14="http://schemas.microsoft.com/office/mac/drawingml/2011/main" val="1"/>
             </a:ext>
           </a:extLst>
         </p:spPr>
@@ -7154,7 +8108,7 @@
           </a:ln>
           <a:extLst>
             <a:ext uri="{C572A759-6A51-4108-AA02-DFA0A04FC94B}">
-              <ma14:wrappingTextBoxFlag xmlns:ma14="http://schemas.microsoft.com/office/mac/drawingml/2011/main" xmlns="" val="1"/>
+              <ma14:wrappingTextBoxFlag xmlns="" xmlns:ma14="http://schemas.microsoft.com/office/mac/drawingml/2011/main" val="1"/>
             </a:ext>
           </a:extLst>
         </p:spPr>
@@ -7197,7 +8151,7 @@
           </a:ln>
           <a:extLst>
             <a:ext uri="{C572A759-6A51-4108-AA02-DFA0A04FC94B}">
-              <ma14:wrappingTextBoxFlag xmlns:ma14="http://schemas.microsoft.com/office/mac/drawingml/2011/main" xmlns="" val="1"/>
+              <ma14:wrappingTextBoxFlag xmlns="" xmlns:ma14="http://schemas.microsoft.com/office/mac/drawingml/2011/main" val="1"/>
             </a:ext>
           </a:extLst>
         </p:spPr>
@@ -7246,7 +8200,7 @@
           </a:ln>
           <a:extLst>
             <a:ext uri="{C572A759-6A51-4108-AA02-DFA0A04FC94B}">
-              <ma14:wrappingTextBoxFlag xmlns:ma14="http://schemas.microsoft.com/office/mac/drawingml/2011/main" xmlns="" val="1"/>
+              <ma14:wrappingTextBoxFlag xmlns="" xmlns:ma14="http://schemas.microsoft.com/office/mac/drawingml/2011/main" val="1"/>
             </a:ext>
           </a:extLst>
         </p:spPr>
@@ -7312,7 +8266,7 @@
           </a:ln>
           <a:extLst>
             <a:ext uri="{C572A759-6A51-4108-AA02-DFA0A04FC94B}">
-              <ma14:wrappingTextBoxFlag xmlns:ma14="http://schemas.microsoft.com/office/mac/drawingml/2011/main" xmlns="" val="1"/>
+              <ma14:wrappingTextBoxFlag xmlns="" xmlns:ma14="http://schemas.microsoft.com/office/mac/drawingml/2011/main" val="1"/>
             </a:ext>
           </a:extLst>
         </p:spPr>
@@ -7497,7 +8451,7 @@
           </a:ln>
           <a:extLst>
             <a:ext uri="{C572A759-6A51-4108-AA02-DFA0A04FC94B}">
-              <ma14:wrappingTextBoxFlag xmlns="" xmlns:ma14="http://schemas.microsoft.com/office/mac/drawingml/2011/main" val="1"/>
+              <ma14:wrappingTextBoxFlag xmlns:ma14="http://schemas.microsoft.com/office/mac/drawingml/2011/main" xmlns="" val="1"/>
             </a:ext>
           </a:extLst>
         </p:spPr>
@@ -7540,7 +8494,7 @@
           </a:ln>
           <a:extLst>
             <a:ext uri="{C572A759-6A51-4108-AA02-DFA0A04FC94B}">
-              <ma14:wrappingTextBoxFlag xmlns="" xmlns:ma14="http://schemas.microsoft.com/office/mac/drawingml/2011/main" val="1"/>
+              <ma14:wrappingTextBoxFlag xmlns:ma14="http://schemas.microsoft.com/office/mac/drawingml/2011/main" xmlns="" val="1"/>
             </a:ext>
           </a:extLst>
         </p:spPr>
@@ -7589,7 +8543,7 @@
           </a:ln>
           <a:extLst>
             <a:ext uri="{C572A759-6A51-4108-AA02-DFA0A04FC94B}">
-              <ma14:wrappingTextBoxFlag xmlns="" xmlns:ma14="http://schemas.microsoft.com/office/mac/drawingml/2011/main" val="1"/>
+              <ma14:wrappingTextBoxFlag xmlns:ma14="http://schemas.microsoft.com/office/mac/drawingml/2011/main" xmlns="" val="1"/>
             </a:ext>
           </a:extLst>
         </p:spPr>
@@ -7655,7 +8609,7 @@
           </a:ln>
           <a:extLst>
             <a:ext uri="{C572A759-6A51-4108-AA02-DFA0A04FC94B}">
-              <ma14:wrappingTextBoxFlag xmlns="" xmlns:ma14="http://schemas.microsoft.com/office/mac/drawingml/2011/main" val="1"/>
+              <ma14:wrappingTextBoxFlag xmlns:ma14="http://schemas.microsoft.com/office/mac/drawingml/2011/main" xmlns="" val="1"/>
             </a:ext>
           </a:extLst>
         </p:spPr>
@@ -7804,7 +8758,7 @@
           </a:ln>
           <a:extLst>
             <a:ext uri="{C572A759-6A51-4108-AA02-DFA0A04FC94B}">
-              <ma14:wrappingTextBoxFlag xmlns:ma14="http://schemas.microsoft.com/office/mac/drawingml/2011/main" xmlns="" val="1"/>
+              <ma14:wrappingTextBoxFlag xmlns="" xmlns:ma14="http://schemas.microsoft.com/office/mac/drawingml/2011/main" val="1"/>
             </a:ext>
           </a:extLst>
         </p:spPr>
@@ -7848,7 +8802,7 @@
           </a:ln>
           <a:extLst>
             <a:ext uri="{C572A759-6A51-4108-AA02-DFA0A04FC94B}">
-              <ma14:wrappingTextBoxFlag xmlns:ma14="http://schemas.microsoft.com/office/mac/drawingml/2011/main" xmlns="" val="1"/>
+              <ma14:wrappingTextBoxFlag xmlns="" xmlns:ma14="http://schemas.microsoft.com/office/mac/drawingml/2011/main" val="1"/>
             </a:ext>
           </a:extLst>
         </p:spPr>
@@ -7903,7 +8857,7 @@
           </a:ln>
           <a:extLst>
             <a:ext uri="{C572A759-6A51-4108-AA02-DFA0A04FC94B}">
-              <ma14:wrappingTextBoxFlag xmlns:ma14="http://schemas.microsoft.com/office/mac/drawingml/2011/main" xmlns="" val="1"/>
+              <ma14:wrappingTextBoxFlag xmlns="" xmlns:ma14="http://schemas.microsoft.com/office/mac/drawingml/2011/main" val="1"/>
             </a:ext>
           </a:extLst>
         </p:spPr>
@@ -7968,7 +8922,7 @@
           </a:ln>
           <a:extLst>
             <a:ext uri="{C572A759-6A51-4108-AA02-DFA0A04FC94B}">
-              <ma14:wrappingTextBoxFlag xmlns:ma14="http://schemas.microsoft.com/office/mac/drawingml/2011/main" xmlns="" val="1"/>
+              <ma14:wrappingTextBoxFlag xmlns="" xmlns:ma14="http://schemas.microsoft.com/office/mac/drawingml/2011/main" val="1"/>
             </a:ext>
           </a:extLst>
         </p:spPr>

</xml_diff>